<commit_message>
#tcc - Apresentação de Slides Finalizada.
</commit_message>
<xml_diff>
--- a/TRABALHOS TEÓRICOS/Slide Apresentacao TCC.pptx
+++ b/TRABALHOS TEÓRICOS/Slide Apresentacao TCC.pptx
@@ -5,52 +5,53 @@
     <p:sldMasterId id="2147483658" r:id="rId1"/>
   </p:sldMasterIdLst>
   <p:notesMasterIdLst>
-    <p:notesMasterId r:id="rId27"/>
+    <p:notesMasterId r:id="rId28"/>
   </p:notesMasterIdLst>
   <p:handoutMasterIdLst>
-    <p:handoutMasterId r:id="rId28"/>
+    <p:handoutMasterId r:id="rId29"/>
   </p:handoutMasterIdLst>
   <p:sldIdLst>
     <p:sldId id="256" r:id="rId2"/>
     <p:sldId id="258" r:id="rId3"/>
     <p:sldId id="295" r:id="rId4"/>
-    <p:sldId id="259" r:id="rId5"/>
-    <p:sldId id="261" r:id="rId6"/>
-    <p:sldId id="262" r:id="rId7"/>
-    <p:sldId id="270" r:id="rId8"/>
-    <p:sldId id="283" r:id="rId9"/>
-    <p:sldId id="284" r:id="rId10"/>
-    <p:sldId id="285" r:id="rId11"/>
-    <p:sldId id="272" r:id="rId12"/>
-    <p:sldId id="286" r:id="rId13"/>
-    <p:sldId id="287" r:id="rId14"/>
-    <p:sldId id="265" r:id="rId15"/>
-    <p:sldId id="266" r:id="rId16"/>
-    <p:sldId id="260" r:id="rId17"/>
-    <p:sldId id="288" r:id="rId18"/>
-    <p:sldId id="289" r:id="rId19"/>
-    <p:sldId id="290" r:id="rId20"/>
-    <p:sldId id="291" r:id="rId21"/>
-    <p:sldId id="292" r:id="rId22"/>
-    <p:sldId id="293" r:id="rId23"/>
-    <p:sldId id="278" r:id="rId24"/>
-    <p:sldId id="294" r:id="rId25"/>
-    <p:sldId id="279" r:id="rId26"/>
+    <p:sldId id="296" r:id="rId5"/>
+    <p:sldId id="260" r:id="rId6"/>
+    <p:sldId id="259" r:id="rId7"/>
+    <p:sldId id="261" r:id="rId8"/>
+    <p:sldId id="262" r:id="rId9"/>
+    <p:sldId id="270" r:id="rId10"/>
+    <p:sldId id="283" r:id="rId11"/>
+    <p:sldId id="284" r:id="rId12"/>
+    <p:sldId id="285" r:id="rId13"/>
+    <p:sldId id="272" r:id="rId14"/>
+    <p:sldId id="286" r:id="rId15"/>
+    <p:sldId id="287" r:id="rId16"/>
+    <p:sldId id="265" r:id="rId17"/>
+    <p:sldId id="266" r:id="rId18"/>
+    <p:sldId id="288" r:id="rId19"/>
+    <p:sldId id="289" r:id="rId20"/>
+    <p:sldId id="290" r:id="rId21"/>
+    <p:sldId id="291" r:id="rId22"/>
+    <p:sldId id="292" r:id="rId23"/>
+    <p:sldId id="293" r:id="rId24"/>
+    <p:sldId id="278" r:id="rId25"/>
+    <p:sldId id="294" r:id="rId26"/>
+    <p:sldId id="279" r:id="rId27"/>
   </p:sldIdLst>
   <p:sldSz cx="9144000" cy="6858000" type="screen4x3"/>
-  <p:notesSz cx="6648450" cy="9850438"/>
+  <p:notesSz cx="7099300" cy="10234613"/>
   <p:embeddedFontLst>
     <p:embeddedFont>
       <p:font typeface="Roboto Slab" panose="020B0604020202020204" charset="0"/>
-      <p:regular r:id="rId29"/>
-      <p:bold r:id="rId30"/>
+      <p:regular r:id="rId30"/>
+      <p:bold r:id="rId31"/>
     </p:embeddedFont>
     <p:embeddedFont>
       <p:font typeface="Source Sans Pro" panose="020B0604020202020204" charset="0"/>
-      <p:regular r:id="rId31"/>
-      <p:bold r:id="rId32"/>
-      <p:italic r:id="rId33"/>
-      <p:boldItalic r:id="rId34"/>
+      <p:regular r:id="rId32"/>
+      <p:bold r:id="rId33"/>
+      <p:italic r:id="rId34"/>
+      <p:boldItalic r:id="rId35"/>
     </p:embeddedFont>
   </p:embeddedFontLst>
   <p:defaultTextStyle>
@@ -306,18 +307,18 @@
         </p:nvSpPr>
         <p:spPr>
           <a:xfrm>
-            <a:off x="0" y="0"/>
-            <a:ext cx="2880995" cy="494233"/>
+            <a:off x="3" y="2"/>
+            <a:ext cx="3076363" cy="513507"/>
           </a:xfrm>
           <a:prstGeom prst="rect">
             <a:avLst/>
           </a:prstGeom>
         </p:spPr>
         <p:txBody>
-          <a:bodyPr vert="horz" lIns="91440" tIns="45720" rIns="91440" bIns="45720" rtlCol="0"/>
+          <a:bodyPr vert="horz" lIns="95619" tIns="47809" rIns="95619" bIns="47809" rtlCol="0"/>
           <a:lstStyle>
             <a:lvl1pPr algn="l">
-              <a:defRPr sz="1200"/>
+              <a:defRPr sz="1300"/>
             </a:lvl1pPr>
           </a:lstStyle>
           <a:p>
@@ -337,24 +338,24 @@
         </p:nvSpPr>
         <p:spPr>
           <a:xfrm>
-            <a:off x="3765916" y="0"/>
-            <a:ext cx="2880995" cy="494233"/>
+            <a:off x="4021296" y="2"/>
+            <a:ext cx="3076363" cy="513507"/>
           </a:xfrm>
           <a:prstGeom prst="rect">
             <a:avLst/>
           </a:prstGeom>
         </p:spPr>
         <p:txBody>
-          <a:bodyPr vert="horz" lIns="91440" tIns="45720" rIns="91440" bIns="45720" rtlCol="0"/>
+          <a:bodyPr vert="horz" lIns="95619" tIns="47809" rIns="95619" bIns="47809" rtlCol="0"/>
           <a:lstStyle>
             <a:lvl1pPr algn="r">
-              <a:defRPr sz="1200"/>
+              <a:defRPr sz="1300"/>
             </a:lvl1pPr>
           </a:lstStyle>
           <a:p>
             <a:fld id="{172676CF-0CF8-42C6-9C50-B81985D21E60}" type="datetimeFigureOut">
               <a:rPr lang="pt-BR" smtClean="0"/>
-              <a:t>01/12/2015</a:t>
+              <a:t>03/12/2015</a:t>
             </a:fld>
             <a:endParaRPr lang="pt-BR"/>
           </a:p>
@@ -372,18 +373,18 @@
         </p:nvSpPr>
         <p:spPr>
           <a:xfrm>
-            <a:off x="0" y="9356207"/>
-            <a:ext cx="2880995" cy="494232"/>
+            <a:off x="3" y="9721108"/>
+            <a:ext cx="3076363" cy="513506"/>
           </a:xfrm>
           <a:prstGeom prst="rect">
             <a:avLst/>
           </a:prstGeom>
         </p:spPr>
         <p:txBody>
-          <a:bodyPr vert="horz" lIns="91440" tIns="45720" rIns="91440" bIns="45720" rtlCol="0" anchor="b"/>
+          <a:bodyPr vert="horz" lIns="95619" tIns="47809" rIns="95619" bIns="47809" rtlCol="0" anchor="b"/>
           <a:lstStyle>
             <a:lvl1pPr algn="l">
-              <a:defRPr sz="1200"/>
+              <a:defRPr sz="1300"/>
             </a:lvl1pPr>
           </a:lstStyle>
           <a:p>
@@ -403,18 +404,18 @@
         </p:nvSpPr>
         <p:spPr>
           <a:xfrm>
-            <a:off x="3765916" y="9356207"/>
-            <a:ext cx="2880995" cy="494232"/>
+            <a:off x="4021296" y="9721108"/>
+            <a:ext cx="3076363" cy="513506"/>
           </a:xfrm>
           <a:prstGeom prst="rect">
             <a:avLst/>
           </a:prstGeom>
         </p:spPr>
         <p:txBody>
-          <a:bodyPr vert="horz" lIns="91440" tIns="45720" rIns="91440" bIns="45720" rtlCol="0" anchor="b"/>
+          <a:bodyPr vert="horz" lIns="95619" tIns="47809" rIns="95619" bIns="47809" rtlCol="0" anchor="b"/>
           <a:lstStyle>
             <a:lvl1pPr algn="r">
-              <a:defRPr sz="1200"/>
+              <a:defRPr sz="1300"/>
             </a:lvl1pPr>
           </a:lstStyle>
           <a:p>
@@ -434,6 +435,7 @@
     </p:extLst>
   </p:cSld>
   <p:clrMap bg1="lt1" tx1="dk1" bg2="lt2" tx2="dk2" accent1="accent1" accent2="accent2" accent3="accent3" accent4="accent4" accent5="accent5" accent6="accent6" hlink="hlink" folHlink="folHlink"/>
+  <p:hf sldNum="0" hdr="0" ftr="0" dt="0"/>
 </p:handoutMaster>
 </file>
 
@@ -471,8 +473,8 @@
         </p:nvSpPr>
         <p:spPr>
           <a:xfrm>
-            <a:off x="862013" y="738188"/>
-            <a:ext cx="4924425" cy="3694112"/>
+            <a:off x="989013" y="766763"/>
+            <a:ext cx="5121275" cy="3840162"/>
           </a:xfrm>
           <a:custGeom>
             <a:avLst/>
@@ -522,8 +524,8 @@
         </p:nvSpPr>
         <p:spPr>
           <a:xfrm>
-            <a:off x="664846" y="4678958"/>
-            <a:ext cx="5318759" cy="4432697"/>
+            <a:off x="709934" y="4861444"/>
+            <a:ext cx="5679439" cy="4605576"/>
           </a:xfrm>
           <a:prstGeom prst="rect">
             <a:avLst/>
@@ -534,7 +536,7 @@
           </a:ln>
         </p:spPr>
         <p:txBody>
-          <a:bodyPr lIns="91425" tIns="91425" rIns="91425" bIns="91425" anchor="t" anchorCtr="0"/>
+          <a:bodyPr lIns="95604" tIns="95604" rIns="95604" bIns="95604" anchor="t" anchorCtr="0"/>
           <a:lstStyle>
             <a:lvl1pPr>
               <a:spcBef>
@@ -604,6 +606,7 @@
     </p:extLst>
   </p:cSld>
   <p:clrMap bg1="lt1" tx1="dk1" bg2="dk2" tx2="lt2" accent1="accent1" accent2="accent2" accent3="accent3" accent4="accent4" accent5="accent5" accent6="accent6" hlink="hlink" folHlink="folHlink"/>
+  <p:hf sldNum="0" hdr="0" ftr="0" dt="0"/>
   <p:notesStyle>
     <a:lvl1pPr marL="0" algn="l" defTabSz="914400" rtl="0" eaLnBrk="1" latinLnBrk="0" hangingPunct="1">
       <a:defRPr sz="1200" kern="1200">
@@ -728,8 +731,8 @@
         </p:nvSpPr>
         <p:spPr>
           <a:xfrm>
-            <a:off x="862013" y="738188"/>
-            <a:ext cx="4924425" cy="3694112"/>
+            <a:off x="989013" y="766763"/>
+            <a:ext cx="5121275" cy="3840162"/>
           </a:xfrm>
           <a:custGeom>
             <a:avLst/>
@@ -779,25 +782,19 @@
         </p:nvSpPr>
         <p:spPr>
           <a:xfrm>
-            <a:off x="664846" y="4678958"/>
-            <a:ext cx="5318759" cy="4432697"/>
+            <a:off x="709934" y="4861444"/>
+            <a:ext cx="5679439" cy="4605576"/>
           </a:xfrm>
           <a:prstGeom prst="rect">
             <a:avLst/>
           </a:prstGeom>
         </p:spPr>
         <p:txBody>
-          <a:bodyPr lIns="91425" tIns="91425" rIns="91425" bIns="91425" anchor="t" anchorCtr="0">
+          <a:bodyPr lIns="95604" tIns="95604" rIns="95604" bIns="95604" anchor="t" anchorCtr="0">
             <a:noAutofit/>
           </a:bodyPr>
           <a:lstStyle/>
           <a:p>
-            <a:pPr>
-              <a:spcBef>
-                <a:spcPts val="0"/>
-              </a:spcBef>
-              <a:buNone/>
-            </a:pPr>
             <a:endParaRPr/>
           </a:p>
         </p:txBody>
@@ -816,6 +813,116 @@
 </file>
 
 <file path=ppt/notesSlides/notesSlide10.xml><?xml version="1.0" encoding="utf-8"?>
+<p:notes xmlns:a="http://schemas.openxmlformats.org/drawingml/2006/main" xmlns:r="http://schemas.openxmlformats.org/officeDocument/2006/relationships" xmlns:p="http://schemas.openxmlformats.org/presentationml/2006/main" showMasterSp="0" showMasterPhAnim="0">
+  <p:cSld>
+    <p:spTree>
+      <p:nvGrpSpPr>
+        <p:cNvPr id="1" name="Shape 85"/>
+        <p:cNvGrpSpPr/>
+        <p:nvPr/>
+      </p:nvGrpSpPr>
+      <p:grpSpPr>
+        <a:xfrm>
+          <a:off x="0" y="0"/>
+          <a:ext cx="0" cy="0"/>
+          <a:chOff x="0" y="0"/>
+          <a:chExt cx="0" cy="0"/>
+        </a:xfrm>
+      </p:grpSpPr>
+      <p:sp>
+        <p:nvSpPr>
+          <p:cNvPr id="86" name="Shape 86"/>
+          <p:cNvSpPr>
+            <a:spLocks noGrp="1" noRot="1" noChangeAspect="1"/>
+          </p:cNvSpPr>
+          <p:nvPr>
+            <p:ph type="sldImg" idx="2"/>
+          </p:nvPr>
+        </p:nvSpPr>
+        <p:spPr>
+          <a:xfrm>
+            <a:off x="989013" y="766763"/>
+            <a:ext cx="5121275" cy="3840162"/>
+          </a:xfrm>
+          <a:custGeom>
+            <a:avLst/>
+            <a:gdLst/>
+            <a:ahLst/>
+            <a:cxnLst/>
+            <a:rect l="0" t="0" r="0" b="0"/>
+            <a:pathLst>
+              <a:path w="120000" h="120000" extrusionOk="0">
+                <a:moveTo>
+                  <a:pt x="0" y="0"/>
+                </a:moveTo>
+                <a:lnTo>
+                  <a:pt x="120000" y="0"/>
+                </a:lnTo>
+                <a:lnTo>
+                  <a:pt x="120000" y="120000"/>
+                </a:lnTo>
+                <a:lnTo>
+                  <a:pt x="0" y="120000"/>
+                </a:lnTo>
+                <a:close/>
+              </a:path>
+            </a:pathLst>
+          </a:custGeom>
+          <a:noFill/>
+          <a:ln w="9525" cap="flat" cmpd="sng">
+            <a:solidFill>
+              <a:srgbClr val="000000"/>
+            </a:solidFill>
+            <a:prstDash val="solid"/>
+            <a:round/>
+            <a:headEnd type="none" w="med" len="med"/>
+            <a:tailEnd type="none" w="med" len="med"/>
+          </a:ln>
+        </p:spPr>
+      </p:sp>
+      <p:sp>
+        <p:nvSpPr>
+          <p:cNvPr id="87" name="Shape 87"/>
+          <p:cNvSpPr txBox="1">
+            <a:spLocks noGrp="1"/>
+          </p:cNvSpPr>
+          <p:nvPr>
+            <p:ph type="body" idx="1"/>
+          </p:nvPr>
+        </p:nvSpPr>
+        <p:spPr>
+          <a:xfrm>
+            <a:off x="709934" y="4861444"/>
+            <a:ext cx="5679439" cy="4605576"/>
+          </a:xfrm>
+          <a:prstGeom prst="rect">
+            <a:avLst/>
+          </a:prstGeom>
+        </p:spPr>
+        <p:txBody>
+          <a:bodyPr lIns="95604" tIns="95604" rIns="95604" bIns="95604" anchor="t" anchorCtr="0">
+            <a:noAutofit/>
+          </a:bodyPr>
+          <a:lstStyle/>
+          <a:p>
+            <a:endParaRPr/>
+          </a:p>
+        </p:txBody>
+      </p:sp>
+    </p:spTree>
+    <p:extLst>
+      <p:ext uri="{BB962C8B-B14F-4D97-AF65-F5344CB8AC3E}">
+        <p14:creationId xmlns:p14="http://schemas.microsoft.com/office/powerpoint/2010/main" val="3489227445"/>
+      </p:ext>
+    </p:extLst>
+  </p:cSld>
+  <p:clrMapOvr>
+    <a:masterClrMapping/>
+  </p:clrMapOvr>
+</p:notes>
+</file>
+
+<file path=ppt/notesSlides/notesSlide11.xml><?xml version="1.0" encoding="utf-8"?>
 <p:notes xmlns:a="http://schemas.openxmlformats.org/drawingml/2006/main" xmlns:r="http://schemas.openxmlformats.org/officeDocument/2006/relationships" xmlns:p="http://schemas.openxmlformats.org/presentationml/2006/main" showMasterSp="0" showMasterPhAnim="0">
   <p:cSld>
     <p:spTree>
@@ -844,8 +951,8 @@
         </p:nvSpPr>
         <p:spPr>
           <a:xfrm>
-            <a:off x="862013" y="738188"/>
-            <a:ext cx="4924425" cy="3694112"/>
+            <a:off x="989013" y="766763"/>
+            <a:ext cx="5121275" cy="3840162"/>
           </a:xfrm>
           <a:custGeom>
             <a:avLst/>
@@ -895,25 +1002,19 @@
         </p:nvSpPr>
         <p:spPr>
           <a:xfrm>
-            <a:off x="664846" y="4678958"/>
-            <a:ext cx="5318759" cy="4432697"/>
+            <a:off x="709934" y="4861444"/>
+            <a:ext cx="5679439" cy="4605576"/>
           </a:xfrm>
           <a:prstGeom prst="rect">
             <a:avLst/>
           </a:prstGeom>
         </p:spPr>
         <p:txBody>
-          <a:bodyPr lIns="91425" tIns="91425" rIns="91425" bIns="91425" anchor="t" anchorCtr="0">
+          <a:bodyPr lIns="95604" tIns="95604" rIns="95604" bIns="95604" anchor="t" anchorCtr="0">
             <a:noAutofit/>
           </a:bodyPr>
           <a:lstStyle/>
           <a:p>
-            <a:pPr>
-              <a:spcBef>
-                <a:spcPts val="0"/>
-              </a:spcBef>
-              <a:buNone/>
-            </a:pPr>
             <a:endParaRPr/>
           </a:p>
         </p:txBody>
@@ -921,123 +1022,7 @@
     </p:spTree>
     <p:extLst>
       <p:ext uri="{BB962C8B-B14F-4D97-AF65-F5344CB8AC3E}">
-        <p14:creationId xmlns:p14="http://schemas.microsoft.com/office/powerpoint/2010/main" val="3732499432"/>
-      </p:ext>
-    </p:extLst>
-  </p:cSld>
-  <p:clrMapOvr>
-    <a:masterClrMapping/>
-  </p:clrMapOvr>
-</p:notes>
-</file>
-
-<file path=ppt/notesSlides/notesSlide11.xml><?xml version="1.0" encoding="utf-8"?>
-<p:notes xmlns:a="http://schemas.openxmlformats.org/drawingml/2006/main" xmlns:r="http://schemas.openxmlformats.org/officeDocument/2006/relationships" xmlns:p="http://schemas.openxmlformats.org/presentationml/2006/main" showMasterSp="0" showMasterPhAnim="0">
-  <p:cSld>
-    <p:spTree>
-      <p:nvGrpSpPr>
-        <p:cNvPr id="1" name="Shape 209"/>
-        <p:cNvGrpSpPr/>
-        <p:nvPr/>
-      </p:nvGrpSpPr>
-      <p:grpSpPr>
-        <a:xfrm>
-          <a:off x="0" y="0"/>
-          <a:ext cx="0" cy="0"/>
-          <a:chOff x="0" y="0"/>
-          <a:chExt cx="0" cy="0"/>
-        </a:xfrm>
-      </p:grpSpPr>
-      <p:sp>
-        <p:nvSpPr>
-          <p:cNvPr id="210" name="Shape 210"/>
-          <p:cNvSpPr>
-            <a:spLocks noGrp="1" noRot="1" noChangeAspect="1"/>
-          </p:cNvSpPr>
-          <p:nvPr>
-            <p:ph type="sldImg" idx="2"/>
-          </p:nvPr>
-        </p:nvSpPr>
-        <p:spPr>
-          <a:xfrm>
-            <a:off x="862013" y="738188"/>
-            <a:ext cx="4924425" cy="3694112"/>
-          </a:xfrm>
-          <a:custGeom>
-            <a:avLst/>
-            <a:gdLst/>
-            <a:ahLst/>
-            <a:cxnLst/>
-            <a:rect l="0" t="0" r="0" b="0"/>
-            <a:pathLst>
-              <a:path w="120000" h="120000" extrusionOk="0">
-                <a:moveTo>
-                  <a:pt x="0" y="0"/>
-                </a:moveTo>
-                <a:lnTo>
-                  <a:pt x="120000" y="0"/>
-                </a:lnTo>
-                <a:lnTo>
-                  <a:pt x="120000" y="120000"/>
-                </a:lnTo>
-                <a:lnTo>
-                  <a:pt x="0" y="120000"/>
-                </a:lnTo>
-                <a:close/>
-              </a:path>
-            </a:pathLst>
-          </a:custGeom>
-          <a:noFill/>
-          <a:ln w="9525" cap="flat" cmpd="sng">
-            <a:solidFill>
-              <a:srgbClr val="000000"/>
-            </a:solidFill>
-            <a:prstDash val="solid"/>
-            <a:round/>
-            <a:headEnd type="none" w="med" len="med"/>
-            <a:tailEnd type="none" w="med" len="med"/>
-          </a:ln>
-        </p:spPr>
-      </p:sp>
-      <p:sp>
-        <p:nvSpPr>
-          <p:cNvPr id="211" name="Shape 211"/>
-          <p:cNvSpPr txBox="1">
-            <a:spLocks noGrp="1"/>
-          </p:cNvSpPr>
-          <p:nvPr>
-            <p:ph type="body" idx="1"/>
-          </p:nvPr>
-        </p:nvSpPr>
-        <p:spPr>
-          <a:xfrm>
-            <a:off x="664846" y="4678958"/>
-            <a:ext cx="5318759" cy="4432697"/>
-          </a:xfrm>
-          <a:prstGeom prst="rect">
-            <a:avLst/>
-          </a:prstGeom>
-        </p:spPr>
-        <p:txBody>
-          <a:bodyPr lIns="91425" tIns="91425" rIns="91425" bIns="91425" anchor="t" anchorCtr="0">
-            <a:noAutofit/>
-          </a:bodyPr>
-          <a:lstStyle/>
-          <a:p>
-            <a:pPr>
-              <a:spcBef>
-                <a:spcPts val="0"/>
-              </a:spcBef>
-              <a:buNone/>
-            </a:pPr>
-            <a:endParaRPr/>
-          </a:p>
-        </p:txBody>
-      </p:sp>
-    </p:spTree>
-    <p:extLst>
-      <p:ext uri="{BB962C8B-B14F-4D97-AF65-F5344CB8AC3E}">
-        <p14:creationId xmlns:p14="http://schemas.microsoft.com/office/powerpoint/2010/main" val="2254422529"/>
+        <p14:creationId xmlns:p14="http://schemas.microsoft.com/office/powerpoint/2010/main" val="3873086416"/>
       </p:ext>
     </p:extLst>
   </p:cSld>
@@ -1076,8 +1061,8 @@
         </p:nvSpPr>
         <p:spPr>
           <a:xfrm>
-            <a:off x="862013" y="738188"/>
-            <a:ext cx="4924425" cy="3694112"/>
+            <a:off x="989013" y="766763"/>
+            <a:ext cx="5121275" cy="3840162"/>
           </a:xfrm>
           <a:custGeom>
             <a:avLst/>
@@ -1127,25 +1112,19 @@
         </p:nvSpPr>
         <p:spPr>
           <a:xfrm>
-            <a:off x="664846" y="4678958"/>
-            <a:ext cx="5318759" cy="4432697"/>
+            <a:off x="709934" y="4861444"/>
+            <a:ext cx="5679439" cy="4605576"/>
           </a:xfrm>
           <a:prstGeom prst="rect">
             <a:avLst/>
           </a:prstGeom>
         </p:spPr>
         <p:txBody>
-          <a:bodyPr lIns="91425" tIns="91425" rIns="91425" bIns="91425" anchor="t" anchorCtr="0">
+          <a:bodyPr lIns="95604" tIns="95604" rIns="95604" bIns="95604" anchor="t" anchorCtr="0">
             <a:noAutofit/>
           </a:bodyPr>
           <a:lstStyle/>
           <a:p>
-            <a:pPr>
-              <a:spcBef>
-                <a:spcPts val="0"/>
-              </a:spcBef>
-              <a:buNone/>
-            </a:pPr>
             <a:endParaRPr/>
           </a:p>
         </p:txBody>
@@ -1153,7 +1132,7 @@
     </p:spTree>
     <p:extLst>
       <p:ext uri="{BB962C8B-B14F-4D97-AF65-F5344CB8AC3E}">
-        <p14:creationId xmlns:p14="http://schemas.microsoft.com/office/powerpoint/2010/main" val="1692133132"/>
+        <p14:creationId xmlns:p14="http://schemas.microsoft.com/office/powerpoint/2010/main" val="3732499432"/>
       </p:ext>
     </p:extLst>
   </p:cSld>
@@ -1164,6 +1143,116 @@
 </file>
 
 <file path=ppt/notesSlides/notesSlide13.xml><?xml version="1.0" encoding="utf-8"?>
+<p:notes xmlns:a="http://schemas.openxmlformats.org/drawingml/2006/main" xmlns:r="http://schemas.openxmlformats.org/officeDocument/2006/relationships" xmlns:p="http://schemas.openxmlformats.org/presentationml/2006/main" showMasterSp="0" showMasterPhAnim="0">
+  <p:cSld>
+    <p:spTree>
+      <p:nvGrpSpPr>
+        <p:cNvPr id="1" name="Shape 209"/>
+        <p:cNvGrpSpPr/>
+        <p:nvPr/>
+      </p:nvGrpSpPr>
+      <p:grpSpPr>
+        <a:xfrm>
+          <a:off x="0" y="0"/>
+          <a:ext cx="0" cy="0"/>
+          <a:chOff x="0" y="0"/>
+          <a:chExt cx="0" cy="0"/>
+        </a:xfrm>
+      </p:grpSpPr>
+      <p:sp>
+        <p:nvSpPr>
+          <p:cNvPr id="210" name="Shape 210"/>
+          <p:cNvSpPr>
+            <a:spLocks noGrp="1" noRot="1" noChangeAspect="1"/>
+          </p:cNvSpPr>
+          <p:nvPr>
+            <p:ph type="sldImg" idx="2"/>
+          </p:nvPr>
+        </p:nvSpPr>
+        <p:spPr>
+          <a:xfrm>
+            <a:off x="989013" y="766763"/>
+            <a:ext cx="5121275" cy="3840162"/>
+          </a:xfrm>
+          <a:custGeom>
+            <a:avLst/>
+            <a:gdLst/>
+            <a:ahLst/>
+            <a:cxnLst/>
+            <a:rect l="0" t="0" r="0" b="0"/>
+            <a:pathLst>
+              <a:path w="120000" h="120000" extrusionOk="0">
+                <a:moveTo>
+                  <a:pt x="0" y="0"/>
+                </a:moveTo>
+                <a:lnTo>
+                  <a:pt x="120000" y="0"/>
+                </a:lnTo>
+                <a:lnTo>
+                  <a:pt x="120000" y="120000"/>
+                </a:lnTo>
+                <a:lnTo>
+                  <a:pt x="0" y="120000"/>
+                </a:lnTo>
+                <a:close/>
+              </a:path>
+            </a:pathLst>
+          </a:custGeom>
+          <a:noFill/>
+          <a:ln w="9525" cap="flat" cmpd="sng">
+            <a:solidFill>
+              <a:srgbClr val="000000"/>
+            </a:solidFill>
+            <a:prstDash val="solid"/>
+            <a:round/>
+            <a:headEnd type="none" w="med" len="med"/>
+            <a:tailEnd type="none" w="med" len="med"/>
+          </a:ln>
+        </p:spPr>
+      </p:sp>
+      <p:sp>
+        <p:nvSpPr>
+          <p:cNvPr id="211" name="Shape 211"/>
+          <p:cNvSpPr txBox="1">
+            <a:spLocks noGrp="1"/>
+          </p:cNvSpPr>
+          <p:nvPr>
+            <p:ph type="body" idx="1"/>
+          </p:nvPr>
+        </p:nvSpPr>
+        <p:spPr>
+          <a:xfrm>
+            <a:off x="709934" y="4861444"/>
+            <a:ext cx="5679439" cy="4605576"/>
+          </a:xfrm>
+          <a:prstGeom prst="rect">
+            <a:avLst/>
+          </a:prstGeom>
+        </p:spPr>
+        <p:txBody>
+          <a:bodyPr lIns="95604" tIns="95604" rIns="95604" bIns="95604" anchor="t" anchorCtr="0">
+            <a:noAutofit/>
+          </a:bodyPr>
+          <a:lstStyle/>
+          <a:p>
+            <a:endParaRPr/>
+          </a:p>
+        </p:txBody>
+      </p:sp>
+    </p:spTree>
+    <p:extLst>
+      <p:ext uri="{BB962C8B-B14F-4D97-AF65-F5344CB8AC3E}">
+        <p14:creationId xmlns:p14="http://schemas.microsoft.com/office/powerpoint/2010/main" val="2254422529"/>
+      </p:ext>
+    </p:extLst>
+  </p:cSld>
+  <p:clrMapOvr>
+    <a:masterClrMapping/>
+  </p:clrMapOvr>
+</p:notes>
+</file>
+
+<file path=ppt/notesSlides/notesSlide14.xml><?xml version="1.0" encoding="utf-8"?>
 <p:notes xmlns:a="http://schemas.openxmlformats.org/drawingml/2006/main" xmlns:r="http://schemas.openxmlformats.org/officeDocument/2006/relationships" xmlns:p="http://schemas.openxmlformats.org/presentationml/2006/main" showMasterSp="0" showMasterPhAnim="0">
   <p:cSld>
     <p:spTree>
@@ -1192,8 +1281,8 @@
         </p:nvSpPr>
         <p:spPr>
           <a:xfrm>
-            <a:off x="862013" y="738188"/>
-            <a:ext cx="4924425" cy="3694112"/>
+            <a:off x="989013" y="766763"/>
+            <a:ext cx="5121275" cy="3840162"/>
           </a:xfrm>
           <a:custGeom>
             <a:avLst/>
@@ -1243,25 +1332,129 @@
         </p:nvSpPr>
         <p:spPr>
           <a:xfrm>
-            <a:off x="664846" y="4678958"/>
-            <a:ext cx="5318759" cy="4432697"/>
+            <a:off x="709934" y="4861444"/>
+            <a:ext cx="5679439" cy="4605576"/>
           </a:xfrm>
           <a:prstGeom prst="rect">
             <a:avLst/>
           </a:prstGeom>
         </p:spPr>
         <p:txBody>
-          <a:bodyPr lIns="91425" tIns="91425" rIns="91425" bIns="91425" anchor="t" anchorCtr="0">
+          <a:bodyPr lIns="95604" tIns="95604" rIns="95604" bIns="95604" anchor="t" anchorCtr="0">
             <a:noAutofit/>
           </a:bodyPr>
           <a:lstStyle/>
           <a:p>
-            <a:pPr>
-              <a:spcBef>
-                <a:spcPts val="0"/>
-              </a:spcBef>
-              <a:buNone/>
-            </a:pPr>
+            <a:endParaRPr/>
+          </a:p>
+        </p:txBody>
+      </p:sp>
+    </p:spTree>
+    <p:extLst>
+      <p:ext uri="{BB962C8B-B14F-4D97-AF65-F5344CB8AC3E}">
+        <p14:creationId xmlns:p14="http://schemas.microsoft.com/office/powerpoint/2010/main" val="1692133132"/>
+      </p:ext>
+    </p:extLst>
+  </p:cSld>
+  <p:clrMapOvr>
+    <a:masterClrMapping/>
+  </p:clrMapOvr>
+</p:notes>
+</file>
+
+<file path=ppt/notesSlides/notesSlide15.xml><?xml version="1.0" encoding="utf-8"?>
+<p:notes xmlns:a="http://schemas.openxmlformats.org/drawingml/2006/main" xmlns:r="http://schemas.openxmlformats.org/officeDocument/2006/relationships" xmlns:p="http://schemas.openxmlformats.org/presentationml/2006/main" showMasterSp="0" showMasterPhAnim="0">
+  <p:cSld>
+    <p:spTree>
+      <p:nvGrpSpPr>
+        <p:cNvPr id="1" name="Shape 96"/>
+        <p:cNvGrpSpPr/>
+        <p:nvPr/>
+      </p:nvGrpSpPr>
+      <p:grpSpPr>
+        <a:xfrm>
+          <a:off x="0" y="0"/>
+          <a:ext cx="0" cy="0"/>
+          <a:chOff x="0" y="0"/>
+          <a:chExt cx="0" cy="0"/>
+        </a:xfrm>
+      </p:grpSpPr>
+      <p:sp>
+        <p:nvSpPr>
+          <p:cNvPr id="97" name="Shape 97"/>
+          <p:cNvSpPr>
+            <a:spLocks noGrp="1" noRot="1" noChangeAspect="1"/>
+          </p:cNvSpPr>
+          <p:nvPr>
+            <p:ph type="sldImg" idx="2"/>
+          </p:nvPr>
+        </p:nvSpPr>
+        <p:spPr>
+          <a:xfrm>
+            <a:off x="989013" y="766763"/>
+            <a:ext cx="5121275" cy="3840162"/>
+          </a:xfrm>
+          <a:custGeom>
+            <a:avLst/>
+            <a:gdLst/>
+            <a:ahLst/>
+            <a:cxnLst/>
+            <a:rect l="0" t="0" r="0" b="0"/>
+            <a:pathLst>
+              <a:path w="120000" h="120000" extrusionOk="0">
+                <a:moveTo>
+                  <a:pt x="0" y="0"/>
+                </a:moveTo>
+                <a:lnTo>
+                  <a:pt x="120000" y="0"/>
+                </a:lnTo>
+                <a:lnTo>
+                  <a:pt x="120000" y="120000"/>
+                </a:lnTo>
+                <a:lnTo>
+                  <a:pt x="0" y="120000"/>
+                </a:lnTo>
+                <a:close/>
+              </a:path>
+            </a:pathLst>
+          </a:custGeom>
+          <a:noFill/>
+          <a:ln w="9525" cap="flat" cmpd="sng">
+            <a:solidFill>
+              <a:srgbClr val="000000"/>
+            </a:solidFill>
+            <a:prstDash val="solid"/>
+            <a:round/>
+            <a:headEnd type="none" w="med" len="med"/>
+            <a:tailEnd type="none" w="med" len="med"/>
+          </a:ln>
+        </p:spPr>
+      </p:sp>
+      <p:sp>
+        <p:nvSpPr>
+          <p:cNvPr id="98" name="Shape 98"/>
+          <p:cNvSpPr txBox="1">
+            <a:spLocks noGrp="1"/>
+          </p:cNvSpPr>
+          <p:nvPr>
+            <p:ph type="body" idx="1"/>
+          </p:nvPr>
+        </p:nvSpPr>
+        <p:spPr>
+          <a:xfrm>
+            <a:off x="709934" y="4861444"/>
+            <a:ext cx="5679439" cy="4605576"/>
+          </a:xfrm>
+          <a:prstGeom prst="rect">
+            <a:avLst/>
+          </a:prstGeom>
+        </p:spPr>
+        <p:txBody>
+          <a:bodyPr lIns="95604" tIns="95604" rIns="95604" bIns="95604" anchor="t" anchorCtr="0">
+            <a:noAutofit/>
+          </a:bodyPr>
+          <a:lstStyle/>
+          <a:p>
             <a:endParaRPr/>
           </a:p>
         </p:txBody>
@@ -1279,7 +1472,7 @@
 </p:notes>
 </file>
 
-<file path=ppt/notesSlides/notesSlide14.xml><?xml version="1.0" encoding="utf-8"?>
+<file path=ppt/notesSlides/notesSlide16.xml><?xml version="1.0" encoding="utf-8"?>
 <p:notes xmlns:a="http://schemas.openxmlformats.org/drawingml/2006/main" xmlns:r="http://schemas.openxmlformats.org/officeDocument/2006/relationships" xmlns:p="http://schemas.openxmlformats.org/presentationml/2006/main" showMasterSp="0" showMasterPhAnim="0">
   <p:cSld>
     <p:spTree>
@@ -1308,8 +1501,8 @@
         </p:nvSpPr>
         <p:spPr>
           <a:xfrm>
-            <a:off x="862013" y="738188"/>
-            <a:ext cx="4924425" cy="3694112"/>
+            <a:off x="989013" y="766763"/>
+            <a:ext cx="5121275" cy="3840162"/>
           </a:xfrm>
           <a:custGeom>
             <a:avLst/>
@@ -1359,25 +1552,19 @@
         </p:nvSpPr>
         <p:spPr>
           <a:xfrm>
-            <a:off x="664846" y="4678958"/>
-            <a:ext cx="5318759" cy="4432697"/>
+            <a:off x="709934" y="4861444"/>
+            <a:ext cx="5679439" cy="4605576"/>
           </a:xfrm>
           <a:prstGeom prst="rect">
             <a:avLst/>
           </a:prstGeom>
         </p:spPr>
         <p:txBody>
-          <a:bodyPr lIns="91425" tIns="91425" rIns="91425" bIns="91425" anchor="t" anchorCtr="0">
+          <a:bodyPr lIns="95604" tIns="95604" rIns="95604" bIns="95604" anchor="t" anchorCtr="0">
             <a:noAutofit/>
           </a:bodyPr>
           <a:lstStyle/>
           <a:p>
-            <a:pPr>
-              <a:spcBef>
-                <a:spcPts val="0"/>
-              </a:spcBef>
-              <a:buNone/>
-            </a:pPr>
             <a:endParaRPr/>
           </a:p>
         </p:txBody>
@@ -1395,7 +1582,7 @@
 </p:notes>
 </file>
 
-<file path=ppt/notesSlides/notesSlide15.xml><?xml version="1.0" encoding="utf-8"?>
+<file path=ppt/notesSlides/notesSlide17.xml><?xml version="1.0" encoding="utf-8"?>
 <p:notes xmlns:a="http://schemas.openxmlformats.org/drawingml/2006/main" xmlns:r="http://schemas.openxmlformats.org/officeDocument/2006/relationships" xmlns:p="http://schemas.openxmlformats.org/presentationml/2006/main" showMasterSp="0" showMasterPhAnim="0">
   <p:cSld>
     <p:spTree>
@@ -1424,8 +1611,8 @@
         </p:nvSpPr>
         <p:spPr>
           <a:xfrm>
-            <a:off x="862013" y="738188"/>
-            <a:ext cx="4924425" cy="3694112"/>
+            <a:off x="989013" y="766763"/>
+            <a:ext cx="5121275" cy="3840162"/>
           </a:xfrm>
           <a:custGeom>
             <a:avLst/>
@@ -1475,25 +1662,19 @@
         </p:nvSpPr>
         <p:spPr>
           <a:xfrm>
-            <a:off x="664846" y="4678958"/>
-            <a:ext cx="5318759" cy="4432697"/>
+            <a:off x="709934" y="4861444"/>
+            <a:ext cx="5679439" cy="4605576"/>
           </a:xfrm>
           <a:prstGeom prst="rect">
             <a:avLst/>
           </a:prstGeom>
         </p:spPr>
         <p:txBody>
-          <a:bodyPr lIns="91425" tIns="91425" rIns="91425" bIns="91425" anchor="t" anchorCtr="0">
+          <a:bodyPr lIns="95604" tIns="95604" rIns="95604" bIns="95604" anchor="t" anchorCtr="0">
             <a:noAutofit/>
           </a:bodyPr>
           <a:lstStyle/>
           <a:p>
-            <a:pPr>
-              <a:spcBef>
-                <a:spcPts val="0"/>
-              </a:spcBef>
-              <a:buNone/>
-            </a:pPr>
             <a:endParaRPr/>
           </a:p>
         </p:txBody>
@@ -1511,123 +1692,7 @@
 </p:notes>
 </file>
 
-<file path=ppt/notesSlides/notesSlide16.xml><?xml version="1.0" encoding="utf-8"?>
-<p:notes xmlns:a="http://schemas.openxmlformats.org/drawingml/2006/main" xmlns:r="http://schemas.openxmlformats.org/officeDocument/2006/relationships" xmlns:p="http://schemas.openxmlformats.org/presentationml/2006/main" showMasterSp="0" showMasterPhAnim="0">
-  <p:cSld>
-    <p:spTree>
-      <p:nvGrpSpPr>
-        <p:cNvPr id="1" name="Shape 90"/>
-        <p:cNvGrpSpPr/>
-        <p:nvPr/>
-      </p:nvGrpSpPr>
-      <p:grpSpPr>
-        <a:xfrm>
-          <a:off x="0" y="0"/>
-          <a:ext cx="0" cy="0"/>
-          <a:chOff x="0" y="0"/>
-          <a:chExt cx="0" cy="0"/>
-        </a:xfrm>
-      </p:grpSpPr>
-      <p:sp>
-        <p:nvSpPr>
-          <p:cNvPr id="91" name="Shape 91"/>
-          <p:cNvSpPr>
-            <a:spLocks noGrp="1" noRot="1" noChangeAspect="1"/>
-          </p:cNvSpPr>
-          <p:nvPr>
-            <p:ph type="sldImg" idx="2"/>
-          </p:nvPr>
-        </p:nvSpPr>
-        <p:spPr>
-          <a:xfrm>
-            <a:off x="862013" y="738188"/>
-            <a:ext cx="4924425" cy="3694112"/>
-          </a:xfrm>
-          <a:custGeom>
-            <a:avLst/>
-            <a:gdLst/>
-            <a:ahLst/>
-            <a:cxnLst/>
-            <a:rect l="0" t="0" r="0" b="0"/>
-            <a:pathLst>
-              <a:path w="120000" h="120000" extrusionOk="0">
-                <a:moveTo>
-                  <a:pt x="0" y="0"/>
-                </a:moveTo>
-                <a:lnTo>
-                  <a:pt x="120000" y="0"/>
-                </a:lnTo>
-                <a:lnTo>
-                  <a:pt x="120000" y="120000"/>
-                </a:lnTo>
-                <a:lnTo>
-                  <a:pt x="0" y="120000"/>
-                </a:lnTo>
-                <a:close/>
-              </a:path>
-            </a:pathLst>
-          </a:custGeom>
-          <a:noFill/>
-          <a:ln w="9525" cap="flat" cmpd="sng">
-            <a:solidFill>
-              <a:srgbClr val="000000"/>
-            </a:solidFill>
-            <a:prstDash val="solid"/>
-            <a:round/>
-            <a:headEnd type="none" w="med" len="med"/>
-            <a:tailEnd type="none" w="med" len="med"/>
-          </a:ln>
-        </p:spPr>
-      </p:sp>
-      <p:sp>
-        <p:nvSpPr>
-          <p:cNvPr id="92" name="Shape 92"/>
-          <p:cNvSpPr txBox="1">
-            <a:spLocks noGrp="1"/>
-          </p:cNvSpPr>
-          <p:nvPr>
-            <p:ph type="body" idx="1"/>
-          </p:nvPr>
-        </p:nvSpPr>
-        <p:spPr>
-          <a:xfrm>
-            <a:off x="664846" y="4678958"/>
-            <a:ext cx="5318759" cy="4432697"/>
-          </a:xfrm>
-          <a:prstGeom prst="rect">
-            <a:avLst/>
-          </a:prstGeom>
-        </p:spPr>
-        <p:txBody>
-          <a:bodyPr lIns="91425" tIns="91425" rIns="91425" bIns="91425" anchor="t" anchorCtr="0">
-            <a:noAutofit/>
-          </a:bodyPr>
-          <a:lstStyle/>
-          <a:p>
-            <a:pPr>
-              <a:spcBef>
-                <a:spcPts val="0"/>
-              </a:spcBef>
-              <a:buNone/>
-            </a:pPr>
-            <a:endParaRPr/>
-          </a:p>
-        </p:txBody>
-      </p:sp>
-    </p:spTree>
-    <p:extLst>
-      <p:ext uri="{BB962C8B-B14F-4D97-AF65-F5344CB8AC3E}">
-        <p14:creationId xmlns:p14="http://schemas.microsoft.com/office/powerpoint/2010/main" val="270422883"/>
-      </p:ext>
-    </p:extLst>
-  </p:cSld>
-  <p:clrMapOvr>
-    <a:masterClrMapping/>
-  </p:clrMapOvr>
-</p:notes>
-</file>
-
-<file path=ppt/notesSlides/notesSlide17.xml><?xml version="1.0" encoding="utf-8"?>
+<file path=ppt/notesSlides/notesSlide18.xml><?xml version="1.0" encoding="utf-8"?>
 <p:notes xmlns:a="http://schemas.openxmlformats.org/drawingml/2006/main" xmlns:r="http://schemas.openxmlformats.org/officeDocument/2006/relationships" xmlns:p="http://schemas.openxmlformats.org/presentationml/2006/main" showMasterSp="0" showMasterPhAnim="0">
   <p:cSld>
     <p:spTree>
@@ -1656,8 +1721,8 @@
         </p:nvSpPr>
         <p:spPr>
           <a:xfrm>
-            <a:off x="862013" y="738188"/>
-            <a:ext cx="4924425" cy="3694112"/>
+            <a:off x="989013" y="766763"/>
+            <a:ext cx="5121275" cy="3840162"/>
           </a:xfrm>
           <a:custGeom>
             <a:avLst/>
@@ -1707,25 +1772,19 @@
         </p:nvSpPr>
         <p:spPr>
           <a:xfrm>
-            <a:off x="664846" y="4678958"/>
-            <a:ext cx="5318759" cy="4432697"/>
+            <a:off x="709934" y="4861444"/>
+            <a:ext cx="5679439" cy="4605576"/>
           </a:xfrm>
           <a:prstGeom prst="rect">
             <a:avLst/>
           </a:prstGeom>
         </p:spPr>
         <p:txBody>
-          <a:bodyPr lIns="91425" tIns="91425" rIns="91425" bIns="91425" anchor="t" anchorCtr="0">
+          <a:bodyPr lIns="95604" tIns="95604" rIns="95604" bIns="95604" anchor="t" anchorCtr="0">
             <a:noAutofit/>
           </a:bodyPr>
           <a:lstStyle/>
           <a:p>
-            <a:pPr>
-              <a:spcBef>
-                <a:spcPts val="0"/>
-              </a:spcBef>
-              <a:buNone/>
-            </a:pPr>
             <a:endParaRPr/>
           </a:p>
         </p:txBody>
@@ -1743,7 +1802,7 @@
 </p:notes>
 </file>
 
-<file path=ppt/notesSlides/notesSlide18.xml><?xml version="1.0" encoding="utf-8"?>
+<file path=ppt/notesSlides/notesSlide19.xml><?xml version="1.0" encoding="utf-8"?>
 <p:notes xmlns:a="http://schemas.openxmlformats.org/drawingml/2006/main" xmlns:r="http://schemas.openxmlformats.org/officeDocument/2006/relationships" xmlns:p="http://schemas.openxmlformats.org/presentationml/2006/main" showMasterSp="0" showMasterPhAnim="0">
   <p:cSld>
     <p:spTree>
@@ -1772,8 +1831,8 @@
         </p:nvSpPr>
         <p:spPr>
           <a:xfrm>
-            <a:off x="862013" y="738188"/>
-            <a:ext cx="4924425" cy="3694112"/>
+            <a:off x="989013" y="766763"/>
+            <a:ext cx="5121275" cy="3840162"/>
           </a:xfrm>
           <a:custGeom>
             <a:avLst/>
@@ -1823,25 +1882,19 @@
         </p:nvSpPr>
         <p:spPr>
           <a:xfrm>
-            <a:off x="664846" y="4678958"/>
-            <a:ext cx="5318759" cy="4432697"/>
+            <a:off x="709934" y="4861444"/>
+            <a:ext cx="5679439" cy="4605576"/>
           </a:xfrm>
           <a:prstGeom prst="rect">
             <a:avLst/>
           </a:prstGeom>
         </p:spPr>
         <p:txBody>
-          <a:bodyPr lIns="91425" tIns="91425" rIns="91425" bIns="91425" anchor="t" anchorCtr="0">
+          <a:bodyPr lIns="95604" tIns="95604" rIns="95604" bIns="95604" anchor="t" anchorCtr="0">
             <a:noAutofit/>
           </a:bodyPr>
           <a:lstStyle/>
           <a:p>
-            <a:pPr>
-              <a:spcBef>
-                <a:spcPts val="0"/>
-              </a:spcBef>
-              <a:buNone/>
-            </a:pPr>
             <a:endParaRPr/>
           </a:p>
         </p:txBody>
@@ -1850,122 +1903,6 @@
     <p:extLst>
       <p:ext uri="{BB962C8B-B14F-4D97-AF65-F5344CB8AC3E}">
         <p14:creationId xmlns:p14="http://schemas.microsoft.com/office/powerpoint/2010/main" val="505997987"/>
-      </p:ext>
-    </p:extLst>
-  </p:cSld>
-  <p:clrMapOvr>
-    <a:masterClrMapping/>
-  </p:clrMapOvr>
-</p:notes>
-</file>
-
-<file path=ppt/notesSlides/notesSlide19.xml><?xml version="1.0" encoding="utf-8"?>
-<p:notes xmlns:a="http://schemas.openxmlformats.org/drawingml/2006/main" xmlns:r="http://schemas.openxmlformats.org/officeDocument/2006/relationships" xmlns:p="http://schemas.openxmlformats.org/presentationml/2006/main" showMasterSp="0" showMasterPhAnim="0">
-  <p:cSld>
-    <p:spTree>
-      <p:nvGrpSpPr>
-        <p:cNvPr id="1" name="Shape 96"/>
-        <p:cNvGrpSpPr/>
-        <p:nvPr/>
-      </p:nvGrpSpPr>
-      <p:grpSpPr>
-        <a:xfrm>
-          <a:off x="0" y="0"/>
-          <a:ext cx="0" cy="0"/>
-          <a:chOff x="0" y="0"/>
-          <a:chExt cx="0" cy="0"/>
-        </a:xfrm>
-      </p:grpSpPr>
-      <p:sp>
-        <p:nvSpPr>
-          <p:cNvPr id="97" name="Shape 97"/>
-          <p:cNvSpPr>
-            <a:spLocks noGrp="1" noRot="1" noChangeAspect="1"/>
-          </p:cNvSpPr>
-          <p:nvPr>
-            <p:ph type="sldImg" idx="2"/>
-          </p:nvPr>
-        </p:nvSpPr>
-        <p:spPr>
-          <a:xfrm>
-            <a:off x="862013" y="738188"/>
-            <a:ext cx="4924425" cy="3694112"/>
-          </a:xfrm>
-          <a:custGeom>
-            <a:avLst/>
-            <a:gdLst/>
-            <a:ahLst/>
-            <a:cxnLst/>
-            <a:rect l="0" t="0" r="0" b="0"/>
-            <a:pathLst>
-              <a:path w="120000" h="120000" extrusionOk="0">
-                <a:moveTo>
-                  <a:pt x="0" y="0"/>
-                </a:moveTo>
-                <a:lnTo>
-                  <a:pt x="120000" y="0"/>
-                </a:lnTo>
-                <a:lnTo>
-                  <a:pt x="120000" y="120000"/>
-                </a:lnTo>
-                <a:lnTo>
-                  <a:pt x="0" y="120000"/>
-                </a:lnTo>
-                <a:close/>
-              </a:path>
-            </a:pathLst>
-          </a:custGeom>
-          <a:noFill/>
-          <a:ln w="9525" cap="flat" cmpd="sng">
-            <a:solidFill>
-              <a:srgbClr val="000000"/>
-            </a:solidFill>
-            <a:prstDash val="solid"/>
-            <a:round/>
-            <a:headEnd type="none" w="med" len="med"/>
-            <a:tailEnd type="none" w="med" len="med"/>
-          </a:ln>
-        </p:spPr>
-      </p:sp>
-      <p:sp>
-        <p:nvSpPr>
-          <p:cNvPr id="98" name="Shape 98"/>
-          <p:cNvSpPr txBox="1">
-            <a:spLocks noGrp="1"/>
-          </p:cNvSpPr>
-          <p:nvPr>
-            <p:ph type="body" idx="1"/>
-          </p:nvPr>
-        </p:nvSpPr>
-        <p:spPr>
-          <a:xfrm>
-            <a:off x="664846" y="4678958"/>
-            <a:ext cx="5318759" cy="4432697"/>
-          </a:xfrm>
-          <a:prstGeom prst="rect">
-            <a:avLst/>
-          </a:prstGeom>
-        </p:spPr>
-        <p:txBody>
-          <a:bodyPr lIns="91425" tIns="91425" rIns="91425" bIns="91425" anchor="t" anchorCtr="0">
-            <a:noAutofit/>
-          </a:bodyPr>
-          <a:lstStyle/>
-          <a:p>
-            <a:pPr>
-              <a:spcBef>
-                <a:spcPts val="0"/>
-              </a:spcBef>
-              <a:buNone/>
-            </a:pPr>
-            <a:endParaRPr/>
-          </a:p>
-        </p:txBody>
-      </p:sp>
-    </p:spTree>
-    <p:extLst>
-      <p:ext uri="{BB962C8B-B14F-4D97-AF65-F5344CB8AC3E}">
-        <p14:creationId xmlns:p14="http://schemas.microsoft.com/office/powerpoint/2010/main" val="2642639832"/>
       </p:ext>
     </p:extLst>
   </p:cSld>
@@ -2004,8 +1941,8 @@
         </p:nvSpPr>
         <p:spPr>
           <a:xfrm>
-            <a:off x="862013" y="738188"/>
-            <a:ext cx="4924425" cy="3694112"/>
+            <a:off x="989013" y="766763"/>
+            <a:ext cx="5121275" cy="3840162"/>
           </a:xfrm>
           <a:custGeom>
             <a:avLst/>
@@ -2055,25 +1992,19 @@
         </p:nvSpPr>
         <p:spPr>
           <a:xfrm>
-            <a:off x="664846" y="4678958"/>
-            <a:ext cx="5318759" cy="4432697"/>
+            <a:off x="709934" y="4861444"/>
+            <a:ext cx="5679439" cy="4605576"/>
           </a:xfrm>
           <a:prstGeom prst="rect">
             <a:avLst/>
           </a:prstGeom>
         </p:spPr>
         <p:txBody>
-          <a:bodyPr lIns="91425" tIns="91425" rIns="91425" bIns="91425" anchor="t" anchorCtr="0">
+          <a:bodyPr lIns="95604" tIns="95604" rIns="95604" bIns="95604" anchor="t" anchorCtr="0">
             <a:noAutofit/>
           </a:bodyPr>
           <a:lstStyle/>
           <a:p>
-            <a:pPr>
-              <a:spcBef>
-                <a:spcPts val="0"/>
-              </a:spcBef>
-              <a:buNone/>
-            </a:pPr>
             <a:endParaRPr/>
           </a:p>
         </p:txBody>
@@ -2120,8 +2051,8 @@
         </p:nvSpPr>
         <p:spPr>
           <a:xfrm>
-            <a:off x="862013" y="738188"/>
-            <a:ext cx="4924425" cy="3694112"/>
+            <a:off x="989013" y="766763"/>
+            <a:ext cx="5121275" cy="3840162"/>
           </a:xfrm>
           <a:custGeom>
             <a:avLst/>
@@ -2171,25 +2102,129 @@
         </p:nvSpPr>
         <p:spPr>
           <a:xfrm>
-            <a:off x="664846" y="4678958"/>
-            <a:ext cx="5318759" cy="4432697"/>
+            <a:off x="709934" y="4861444"/>
+            <a:ext cx="5679439" cy="4605576"/>
           </a:xfrm>
           <a:prstGeom prst="rect">
             <a:avLst/>
           </a:prstGeom>
         </p:spPr>
         <p:txBody>
-          <a:bodyPr lIns="91425" tIns="91425" rIns="91425" bIns="91425" anchor="t" anchorCtr="0">
+          <a:bodyPr lIns="95604" tIns="95604" rIns="95604" bIns="95604" anchor="t" anchorCtr="0">
             <a:noAutofit/>
           </a:bodyPr>
           <a:lstStyle/>
           <a:p>
-            <a:pPr>
-              <a:spcBef>
-                <a:spcPts val="0"/>
-              </a:spcBef>
-              <a:buNone/>
-            </a:pPr>
+            <a:endParaRPr/>
+          </a:p>
+        </p:txBody>
+      </p:sp>
+    </p:spTree>
+    <p:extLst>
+      <p:ext uri="{BB962C8B-B14F-4D97-AF65-F5344CB8AC3E}">
+        <p14:creationId xmlns:p14="http://schemas.microsoft.com/office/powerpoint/2010/main" val="2642639832"/>
+      </p:ext>
+    </p:extLst>
+  </p:cSld>
+  <p:clrMapOvr>
+    <a:masterClrMapping/>
+  </p:clrMapOvr>
+</p:notes>
+</file>
+
+<file path=ppt/notesSlides/notesSlide21.xml><?xml version="1.0" encoding="utf-8"?>
+<p:notes xmlns:a="http://schemas.openxmlformats.org/drawingml/2006/main" xmlns:r="http://schemas.openxmlformats.org/officeDocument/2006/relationships" xmlns:p="http://schemas.openxmlformats.org/presentationml/2006/main" showMasterSp="0" showMasterPhAnim="0">
+  <p:cSld>
+    <p:spTree>
+      <p:nvGrpSpPr>
+        <p:cNvPr id="1" name="Shape 96"/>
+        <p:cNvGrpSpPr/>
+        <p:nvPr/>
+      </p:nvGrpSpPr>
+      <p:grpSpPr>
+        <a:xfrm>
+          <a:off x="0" y="0"/>
+          <a:ext cx="0" cy="0"/>
+          <a:chOff x="0" y="0"/>
+          <a:chExt cx="0" cy="0"/>
+        </a:xfrm>
+      </p:grpSpPr>
+      <p:sp>
+        <p:nvSpPr>
+          <p:cNvPr id="97" name="Shape 97"/>
+          <p:cNvSpPr>
+            <a:spLocks noGrp="1" noRot="1" noChangeAspect="1"/>
+          </p:cNvSpPr>
+          <p:nvPr>
+            <p:ph type="sldImg" idx="2"/>
+          </p:nvPr>
+        </p:nvSpPr>
+        <p:spPr>
+          <a:xfrm>
+            <a:off x="989013" y="766763"/>
+            <a:ext cx="5121275" cy="3840162"/>
+          </a:xfrm>
+          <a:custGeom>
+            <a:avLst/>
+            <a:gdLst/>
+            <a:ahLst/>
+            <a:cxnLst/>
+            <a:rect l="0" t="0" r="0" b="0"/>
+            <a:pathLst>
+              <a:path w="120000" h="120000" extrusionOk="0">
+                <a:moveTo>
+                  <a:pt x="0" y="0"/>
+                </a:moveTo>
+                <a:lnTo>
+                  <a:pt x="120000" y="0"/>
+                </a:lnTo>
+                <a:lnTo>
+                  <a:pt x="120000" y="120000"/>
+                </a:lnTo>
+                <a:lnTo>
+                  <a:pt x="0" y="120000"/>
+                </a:lnTo>
+                <a:close/>
+              </a:path>
+            </a:pathLst>
+          </a:custGeom>
+          <a:noFill/>
+          <a:ln w="9525" cap="flat" cmpd="sng">
+            <a:solidFill>
+              <a:srgbClr val="000000"/>
+            </a:solidFill>
+            <a:prstDash val="solid"/>
+            <a:round/>
+            <a:headEnd type="none" w="med" len="med"/>
+            <a:tailEnd type="none" w="med" len="med"/>
+          </a:ln>
+        </p:spPr>
+      </p:sp>
+      <p:sp>
+        <p:nvSpPr>
+          <p:cNvPr id="98" name="Shape 98"/>
+          <p:cNvSpPr txBox="1">
+            <a:spLocks noGrp="1"/>
+          </p:cNvSpPr>
+          <p:nvPr>
+            <p:ph type="body" idx="1"/>
+          </p:nvPr>
+        </p:nvSpPr>
+        <p:spPr>
+          <a:xfrm>
+            <a:off x="709934" y="4861444"/>
+            <a:ext cx="5679439" cy="4605576"/>
+          </a:xfrm>
+          <a:prstGeom prst="rect">
+            <a:avLst/>
+          </a:prstGeom>
+        </p:spPr>
+        <p:txBody>
+          <a:bodyPr lIns="95604" tIns="95604" rIns="95604" bIns="95604" anchor="t" anchorCtr="0">
+            <a:noAutofit/>
+          </a:bodyPr>
+          <a:lstStyle/>
+          <a:p>
             <a:endParaRPr/>
           </a:p>
         </p:txBody>
@@ -2207,7 +2242,7 @@
 </p:notes>
 </file>
 
-<file path=ppt/notesSlides/notesSlide21.xml><?xml version="1.0" encoding="utf-8"?>
+<file path=ppt/notesSlides/notesSlide22.xml><?xml version="1.0" encoding="utf-8"?>
 <p:notes xmlns:a="http://schemas.openxmlformats.org/drawingml/2006/main" xmlns:r="http://schemas.openxmlformats.org/officeDocument/2006/relationships" xmlns:p="http://schemas.openxmlformats.org/presentationml/2006/main" showMasterSp="0" showMasterPhAnim="0">
   <p:cSld>
     <p:spTree>
@@ -2236,8 +2271,8 @@
         </p:nvSpPr>
         <p:spPr>
           <a:xfrm>
-            <a:off x="862013" y="738188"/>
-            <a:ext cx="4924425" cy="3694112"/>
+            <a:off x="989013" y="766763"/>
+            <a:ext cx="5121275" cy="3840162"/>
           </a:xfrm>
           <a:custGeom>
             <a:avLst/>
@@ -2287,25 +2322,19 @@
         </p:nvSpPr>
         <p:spPr>
           <a:xfrm>
-            <a:off x="664846" y="4678958"/>
-            <a:ext cx="5318759" cy="4432697"/>
+            <a:off x="709934" y="4861444"/>
+            <a:ext cx="5679439" cy="4605576"/>
           </a:xfrm>
           <a:prstGeom prst="rect">
             <a:avLst/>
           </a:prstGeom>
         </p:spPr>
         <p:txBody>
-          <a:bodyPr lIns="91425" tIns="91425" rIns="91425" bIns="91425" anchor="t" anchorCtr="0">
+          <a:bodyPr lIns="95604" tIns="95604" rIns="95604" bIns="95604" anchor="t" anchorCtr="0">
             <a:noAutofit/>
           </a:bodyPr>
           <a:lstStyle/>
           <a:p>
-            <a:pPr>
-              <a:spcBef>
-                <a:spcPts val="0"/>
-              </a:spcBef>
-              <a:buNone/>
-            </a:pPr>
             <a:endParaRPr/>
           </a:p>
         </p:txBody>
@@ -2323,7 +2352,7 @@
 </p:notes>
 </file>
 
-<file path=ppt/notesSlides/notesSlide22.xml><?xml version="1.0" encoding="utf-8"?>
+<file path=ppt/notesSlides/notesSlide23.xml><?xml version="1.0" encoding="utf-8"?>
 <p:notes xmlns:a="http://schemas.openxmlformats.org/drawingml/2006/main" xmlns:r="http://schemas.openxmlformats.org/officeDocument/2006/relationships" xmlns:p="http://schemas.openxmlformats.org/presentationml/2006/main" showMasterSp="0" showMasterPhAnim="0">
   <p:cSld>
     <p:spTree>
@@ -2352,8 +2381,8 @@
         </p:nvSpPr>
         <p:spPr>
           <a:xfrm>
-            <a:off x="862013" y="738188"/>
-            <a:ext cx="4924425" cy="3694112"/>
+            <a:off x="989013" y="766763"/>
+            <a:ext cx="5121275" cy="3840162"/>
           </a:xfrm>
           <a:custGeom>
             <a:avLst/>
@@ -2403,25 +2432,19 @@
         </p:nvSpPr>
         <p:spPr>
           <a:xfrm>
-            <a:off x="664846" y="4678958"/>
-            <a:ext cx="5318759" cy="4432697"/>
+            <a:off x="709934" y="4861444"/>
+            <a:ext cx="5679439" cy="4605576"/>
           </a:xfrm>
           <a:prstGeom prst="rect">
             <a:avLst/>
           </a:prstGeom>
         </p:spPr>
         <p:txBody>
-          <a:bodyPr lIns="91425" tIns="91425" rIns="91425" bIns="91425" anchor="t" anchorCtr="0">
+          <a:bodyPr lIns="95604" tIns="95604" rIns="95604" bIns="95604" anchor="t" anchorCtr="0">
             <a:noAutofit/>
           </a:bodyPr>
           <a:lstStyle/>
           <a:p>
-            <a:pPr>
-              <a:spcBef>
-                <a:spcPts val="0"/>
-              </a:spcBef>
-              <a:buNone/>
-            </a:pPr>
             <a:endParaRPr/>
           </a:p>
         </p:txBody>
@@ -2439,7 +2462,7 @@
 </p:notes>
 </file>
 
-<file path=ppt/notesSlides/notesSlide23.xml><?xml version="1.0" encoding="utf-8"?>
+<file path=ppt/notesSlides/notesSlide24.xml><?xml version="1.0" encoding="utf-8"?>
 <p:notes xmlns:a="http://schemas.openxmlformats.org/drawingml/2006/main" xmlns:r="http://schemas.openxmlformats.org/officeDocument/2006/relationships" xmlns:p="http://schemas.openxmlformats.org/presentationml/2006/main" showMasterSp="0" showMasterPhAnim="0">
   <p:cSld>
     <p:spTree>
@@ -2468,8 +2491,8 @@
         </p:nvSpPr>
         <p:spPr>
           <a:xfrm>
-            <a:off x="862013" y="738188"/>
-            <a:ext cx="4924425" cy="3694112"/>
+            <a:off x="989013" y="766763"/>
+            <a:ext cx="5121275" cy="3840162"/>
           </a:xfrm>
           <a:custGeom>
             <a:avLst/>
@@ -2519,25 +2542,19 @@
         </p:nvSpPr>
         <p:spPr>
           <a:xfrm>
-            <a:off x="664846" y="4678958"/>
-            <a:ext cx="5318759" cy="4432697"/>
+            <a:off x="709934" y="4861444"/>
+            <a:ext cx="5679439" cy="4605576"/>
           </a:xfrm>
           <a:prstGeom prst="rect">
             <a:avLst/>
           </a:prstGeom>
         </p:spPr>
         <p:txBody>
-          <a:bodyPr lIns="91425" tIns="91425" rIns="91425" bIns="91425" anchor="t" anchorCtr="0">
+          <a:bodyPr lIns="95604" tIns="95604" rIns="95604" bIns="95604" anchor="t" anchorCtr="0">
             <a:noAutofit/>
           </a:bodyPr>
           <a:lstStyle/>
           <a:p>
-            <a:pPr lvl="0" rtl="0">
-              <a:spcBef>
-                <a:spcPts val="0"/>
-              </a:spcBef>
-              <a:buNone/>
-            </a:pPr>
             <a:endParaRPr/>
           </a:p>
         </p:txBody>
@@ -2555,7 +2572,7 @@
 </p:notes>
 </file>
 
-<file path=ppt/notesSlides/notesSlide24.xml><?xml version="1.0" encoding="utf-8"?>
+<file path=ppt/notesSlides/notesSlide25.xml><?xml version="1.0" encoding="utf-8"?>
 <p:notes xmlns:a="http://schemas.openxmlformats.org/drawingml/2006/main" xmlns:r="http://schemas.openxmlformats.org/officeDocument/2006/relationships" xmlns:p="http://schemas.openxmlformats.org/presentationml/2006/main" showMasterSp="0" showMasterPhAnim="0">
   <p:cSld>
     <p:spTree>
@@ -2584,8 +2601,8 @@
         </p:nvSpPr>
         <p:spPr>
           <a:xfrm>
-            <a:off x="862013" y="738188"/>
-            <a:ext cx="4924425" cy="3694112"/>
+            <a:off x="989013" y="766763"/>
+            <a:ext cx="5121275" cy="3840162"/>
           </a:xfrm>
           <a:custGeom>
             <a:avLst/>
@@ -2635,25 +2652,19 @@
         </p:nvSpPr>
         <p:spPr>
           <a:xfrm>
-            <a:off x="664846" y="4678958"/>
-            <a:ext cx="5318759" cy="4432697"/>
+            <a:off x="709934" y="4861444"/>
+            <a:ext cx="5679439" cy="4605576"/>
           </a:xfrm>
           <a:prstGeom prst="rect">
             <a:avLst/>
           </a:prstGeom>
         </p:spPr>
         <p:txBody>
-          <a:bodyPr lIns="91425" tIns="91425" rIns="91425" bIns="91425" anchor="t" anchorCtr="0">
+          <a:bodyPr lIns="95604" tIns="95604" rIns="95604" bIns="95604" anchor="t" anchorCtr="0">
             <a:noAutofit/>
           </a:bodyPr>
           <a:lstStyle/>
           <a:p>
-            <a:pPr>
-              <a:spcBef>
-                <a:spcPts val="0"/>
-              </a:spcBef>
-              <a:buNone/>
-            </a:pPr>
             <a:endParaRPr/>
           </a:p>
         </p:txBody>
@@ -2671,7 +2682,7 @@
 </p:notes>
 </file>
 
-<file path=ppt/notesSlides/notesSlide25.xml><?xml version="1.0" encoding="utf-8"?>
+<file path=ppt/notesSlides/notesSlide26.xml><?xml version="1.0" encoding="utf-8"?>
 <p:notes xmlns:a="http://schemas.openxmlformats.org/drawingml/2006/main" xmlns:r="http://schemas.openxmlformats.org/officeDocument/2006/relationships" xmlns:p="http://schemas.openxmlformats.org/presentationml/2006/main" showMasterSp="0" showMasterPhAnim="0">
   <p:cSld>
     <p:spTree>
@@ -2700,8 +2711,8 @@
         </p:nvSpPr>
         <p:spPr>
           <a:xfrm>
-            <a:off x="862013" y="738188"/>
-            <a:ext cx="4924425" cy="3694112"/>
+            <a:off x="989013" y="766763"/>
+            <a:ext cx="5121275" cy="3840162"/>
           </a:xfrm>
           <a:custGeom>
             <a:avLst/>
@@ -2751,25 +2762,19 @@
         </p:nvSpPr>
         <p:spPr>
           <a:xfrm>
-            <a:off x="664846" y="4678958"/>
-            <a:ext cx="5318759" cy="4432697"/>
+            <a:off x="709934" y="4861444"/>
+            <a:ext cx="5679439" cy="4605576"/>
           </a:xfrm>
           <a:prstGeom prst="rect">
             <a:avLst/>
           </a:prstGeom>
         </p:spPr>
         <p:txBody>
-          <a:bodyPr lIns="91425" tIns="91425" rIns="91425" bIns="91425" anchor="t" anchorCtr="0">
+          <a:bodyPr lIns="95604" tIns="95604" rIns="95604" bIns="95604" anchor="t" anchorCtr="0">
             <a:noAutofit/>
           </a:bodyPr>
           <a:lstStyle/>
           <a:p>
-            <a:pPr>
-              <a:spcBef>
-                <a:spcPts val="0"/>
-              </a:spcBef>
-              <a:buNone/>
-            </a:pPr>
             <a:endParaRPr/>
           </a:p>
         </p:txBody>
@@ -2816,8 +2821,8 @@
         </p:nvSpPr>
         <p:spPr>
           <a:xfrm>
-            <a:off x="862013" y="738188"/>
-            <a:ext cx="4924425" cy="3694112"/>
+            <a:off x="989013" y="766763"/>
+            <a:ext cx="5121275" cy="3840162"/>
           </a:xfrm>
           <a:custGeom>
             <a:avLst/>
@@ -2867,25 +2872,19 @@
         </p:nvSpPr>
         <p:spPr>
           <a:xfrm>
-            <a:off x="664846" y="4678958"/>
-            <a:ext cx="5318759" cy="4432697"/>
+            <a:off x="709934" y="4861444"/>
+            <a:ext cx="5679439" cy="4605576"/>
           </a:xfrm>
           <a:prstGeom prst="rect">
             <a:avLst/>
           </a:prstGeom>
         </p:spPr>
         <p:txBody>
-          <a:bodyPr lIns="91425" tIns="91425" rIns="91425" bIns="91425" anchor="t" anchorCtr="0">
+          <a:bodyPr lIns="95604" tIns="95604" rIns="95604" bIns="95604" anchor="t" anchorCtr="0">
             <a:noAutofit/>
           </a:bodyPr>
           <a:lstStyle/>
           <a:p>
-            <a:pPr>
-              <a:spcBef>
-                <a:spcPts val="0"/>
-              </a:spcBef>
-              <a:buNone/>
-            </a:pPr>
             <a:endParaRPr/>
           </a:p>
         </p:txBody>
@@ -2904,6 +2903,226 @@
 </file>
 
 <file path=ppt/notesSlides/notesSlide4.xml><?xml version="1.0" encoding="utf-8"?>
+<p:notes xmlns:a="http://schemas.openxmlformats.org/drawingml/2006/main" xmlns:r="http://schemas.openxmlformats.org/officeDocument/2006/relationships" xmlns:p="http://schemas.openxmlformats.org/presentationml/2006/main" showMasterSp="0" showMasterPhAnim="0">
+  <p:cSld>
+    <p:spTree>
+      <p:nvGrpSpPr>
+        <p:cNvPr id="1" name="Shape 90"/>
+        <p:cNvGrpSpPr/>
+        <p:nvPr/>
+      </p:nvGrpSpPr>
+      <p:grpSpPr>
+        <a:xfrm>
+          <a:off x="0" y="0"/>
+          <a:ext cx="0" cy="0"/>
+          <a:chOff x="0" y="0"/>
+          <a:chExt cx="0" cy="0"/>
+        </a:xfrm>
+      </p:grpSpPr>
+      <p:sp>
+        <p:nvSpPr>
+          <p:cNvPr id="91" name="Shape 91"/>
+          <p:cNvSpPr>
+            <a:spLocks noGrp="1" noRot="1" noChangeAspect="1"/>
+          </p:cNvSpPr>
+          <p:nvPr>
+            <p:ph type="sldImg" idx="2"/>
+          </p:nvPr>
+        </p:nvSpPr>
+        <p:spPr>
+          <a:xfrm>
+            <a:off x="989013" y="766763"/>
+            <a:ext cx="5121275" cy="3840162"/>
+          </a:xfrm>
+          <a:custGeom>
+            <a:avLst/>
+            <a:gdLst/>
+            <a:ahLst/>
+            <a:cxnLst/>
+            <a:rect l="0" t="0" r="0" b="0"/>
+            <a:pathLst>
+              <a:path w="120000" h="120000" extrusionOk="0">
+                <a:moveTo>
+                  <a:pt x="0" y="0"/>
+                </a:moveTo>
+                <a:lnTo>
+                  <a:pt x="120000" y="0"/>
+                </a:lnTo>
+                <a:lnTo>
+                  <a:pt x="120000" y="120000"/>
+                </a:lnTo>
+                <a:lnTo>
+                  <a:pt x="0" y="120000"/>
+                </a:lnTo>
+                <a:close/>
+              </a:path>
+            </a:pathLst>
+          </a:custGeom>
+          <a:noFill/>
+          <a:ln w="9525" cap="flat" cmpd="sng">
+            <a:solidFill>
+              <a:srgbClr val="000000"/>
+            </a:solidFill>
+            <a:prstDash val="solid"/>
+            <a:round/>
+            <a:headEnd type="none" w="med" len="med"/>
+            <a:tailEnd type="none" w="med" len="med"/>
+          </a:ln>
+        </p:spPr>
+      </p:sp>
+      <p:sp>
+        <p:nvSpPr>
+          <p:cNvPr id="92" name="Shape 92"/>
+          <p:cNvSpPr txBox="1">
+            <a:spLocks noGrp="1"/>
+          </p:cNvSpPr>
+          <p:nvPr>
+            <p:ph type="body" idx="1"/>
+          </p:nvPr>
+        </p:nvSpPr>
+        <p:spPr>
+          <a:xfrm>
+            <a:off x="709934" y="4861444"/>
+            <a:ext cx="5679439" cy="4605576"/>
+          </a:xfrm>
+          <a:prstGeom prst="rect">
+            <a:avLst/>
+          </a:prstGeom>
+        </p:spPr>
+        <p:txBody>
+          <a:bodyPr lIns="95604" tIns="95604" rIns="95604" bIns="95604" anchor="t" anchorCtr="0">
+            <a:noAutofit/>
+          </a:bodyPr>
+          <a:lstStyle/>
+          <a:p>
+            <a:endParaRPr/>
+          </a:p>
+        </p:txBody>
+      </p:sp>
+    </p:spTree>
+    <p:extLst>
+      <p:ext uri="{BB962C8B-B14F-4D97-AF65-F5344CB8AC3E}">
+        <p14:creationId xmlns:p14="http://schemas.microsoft.com/office/powerpoint/2010/main" val="1653035616"/>
+      </p:ext>
+    </p:extLst>
+  </p:cSld>
+  <p:clrMapOvr>
+    <a:masterClrMapping/>
+  </p:clrMapOvr>
+</p:notes>
+</file>
+
+<file path=ppt/notesSlides/notesSlide5.xml><?xml version="1.0" encoding="utf-8"?>
+<p:notes xmlns:a="http://schemas.openxmlformats.org/drawingml/2006/main" xmlns:r="http://schemas.openxmlformats.org/officeDocument/2006/relationships" xmlns:p="http://schemas.openxmlformats.org/presentationml/2006/main" showMasterSp="0" showMasterPhAnim="0">
+  <p:cSld>
+    <p:spTree>
+      <p:nvGrpSpPr>
+        <p:cNvPr id="1" name="Shape 90"/>
+        <p:cNvGrpSpPr/>
+        <p:nvPr/>
+      </p:nvGrpSpPr>
+      <p:grpSpPr>
+        <a:xfrm>
+          <a:off x="0" y="0"/>
+          <a:ext cx="0" cy="0"/>
+          <a:chOff x="0" y="0"/>
+          <a:chExt cx="0" cy="0"/>
+        </a:xfrm>
+      </p:grpSpPr>
+      <p:sp>
+        <p:nvSpPr>
+          <p:cNvPr id="91" name="Shape 91"/>
+          <p:cNvSpPr>
+            <a:spLocks noGrp="1" noRot="1" noChangeAspect="1"/>
+          </p:cNvSpPr>
+          <p:nvPr>
+            <p:ph type="sldImg" idx="2"/>
+          </p:nvPr>
+        </p:nvSpPr>
+        <p:spPr>
+          <a:xfrm>
+            <a:off x="989013" y="766763"/>
+            <a:ext cx="5121275" cy="3840162"/>
+          </a:xfrm>
+          <a:custGeom>
+            <a:avLst/>
+            <a:gdLst/>
+            <a:ahLst/>
+            <a:cxnLst/>
+            <a:rect l="0" t="0" r="0" b="0"/>
+            <a:pathLst>
+              <a:path w="120000" h="120000" extrusionOk="0">
+                <a:moveTo>
+                  <a:pt x="0" y="0"/>
+                </a:moveTo>
+                <a:lnTo>
+                  <a:pt x="120000" y="0"/>
+                </a:lnTo>
+                <a:lnTo>
+                  <a:pt x="120000" y="120000"/>
+                </a:lnTo>
+                <a:lnTo>
+                  <a:pt x="0" y="120000"/>
+                </a:lnTo>
+                <a:close/>
+              </a:path>
+            </a:pathLst>
+          </a:custGeom>
+          <a:noFill/>
+          <a:ln w="9525" cap="flat" cmpd="sng">
+            <a:solidFill>
+              <a:srgbClr val="000000"/>
+            </a:solidFill>
+            <a:prstDash val="solid"/>
+            <a:round/>
+            <a:headEnd type="none" w="med" len="med"/>
+            <a:tailEnd type="none" w="med" len="med"/>
+          </a:ln>
+        </p:spPr>
+      </p:sp>
+      <p:sp>
+        <p:nvSpPr>
+          <p:cNvPr id="92" name="Shape 92"/>
+          <p:cNvSpPr txBox="1">
+            <a:spLocks noGrp="1"/>
+          </p:cNvSpPr>
+          <p:nvPr>
+            <p:ph type="body" idx="1"/>
+          </p:nvPr>
+        </p:nvSpPr>
+        <p:spPr>
+          <a:xfrm>
+            <a:off x="709934" y="4861444"/>
+            <a:ext cx="5679439" cy="4605576"/>
+          </a:xfrm>
+          <a:prstGeom prst="rect">
+            <a:avLst/>
+          </a:prstGeom>
+        </p:spPr>
+        <p:txBody>
+          <a:bodyPr lIns="95604" tIns="95604" rIns="95604" bIns="95604" anchor="t" anchorCtr="0">
+            <a:noAutofit/>
+          </a:bodyPr>
+          <a:lstStyle/>
+          <a:p>
+            <a:endParaRPr/>
+          </a:p>
+        </p:txBody>
+      </p:sp>
+    </p:spTree>
+    <p:extLst>
+      <p:ext uri="{BB962C8B-B14F-4D97-AF65-F5344CB8AC3E}">
+        <p14:creationId xmlns:p14="http://schemas.microsoft.com/office/powerpoint/2010/main" val="270422883"/>
+      </p:ext>
+    </p:extLst>
+  </p:cSld>
+  <p:clrMapOvr>
+    <a:masterClrMapping/>
+  </p:clrMapOvr>
+</p:notes>
+</file>
+
+<file path=ppt/notesSlides/notesSlide6.xml><?xml version="1.0" encoding="utf-8"?>
 <p:notes xmlns:a="http://schemas.openxmlformats.org/drawingml/2006/main" xmlns:r="http://schemas.openxmlformats.org/officeDocument/2006/relationships" xmlns:p="http://schemas.openxmlformats.org/presentationml/2006/main" showMasterSp="0" showMasterPhAnim="0">
   <p:cSld>
     <p:spTree>
@@ -2932,8 +3151,8 @@
         </p:nvSpPr>
         <p:spPr>
           <a:xfrm>
-            <a:off x="862013" y="738188"/>
-            <a:ext cx="4924425" cy="3694112"/>
+            <a:off x="989013" y="766763"/>
+            <a:ext cx="5121275" cy="3840162"/>
           </a:xfrm>
           <a:custGeom>
             <a:avLst/>
@@ -2983,25 +3202,19 @@
         </p:nvSpPr>
         <p:spPr>
           <a:xfrm>
-            <a:off x="664846" y="4678958"/>
-            <a:ext cx="5318759" cy="4432697"/>
+            <a:off x="709934" y="4861444"/>
+            <a:ext cx="5679439" cy="4605576"/>
           </a:xfrm>
           <a:prstGeom prst="rect">
             <a:avLst/>
           </a:prstGeom>
         </p:spPr>
         <p:txBody>
-          <a:bodyPr lIns="91425" tIns="91425" rIns="91425" bIns="91425" anchor="t" anchorCtr="0">
+          <a:bodyPr lIns="95604" tIns="95604" rIns="95604" bIns="95604" anchor="t" anchorCtr="0">
             <a:noAutofit/>
           </a:bodyPr>
           <a:lstStyle/>
           <a:p>
-            <a:pPr>
-              <a:spcBef>
-                <a:spcPts val="0"/>
-              </a:spcBef>
-              <a:buNone/>
-            </a:pPr>
             <a:endParaRPr/>
           </a:p>
         </p:txBody>
@@ -3019,7 +3232,7 @@
 </p:notes>
 </file>
 
-<file path=ppt/notesSlides/notesSlide5.xml><?xml version="1.0" encoding="utf-8"?>
+<file path=ppt/notesSlides/notesSlide7.xml><?xml version="1.0" encoding="utf-8"?>
 <p:notes xmlns:a="http://schemas.openxmlformats.org/drawingml/2006/main" xmlns:r="http://schemas.openxmlformats.org/officeDocument/2006/relationships" xmlns:p="http://schemas.openxmlformats.org/presentationml/2006/main" showMasterSp="0" showMasterPhAnim="0">
   <p:cSld>
     <p:spTree>
@@ -3048,8 +3261,8 @@
         </p:nvSpPr>
         <p:spPr>
           <a:xfrm>
-            <a:off x="862013" y="738188"/>
-            <a:ext cx="4924425" cy="3694112"/>
+            <a:off x="989013" y="766763"/>
+            <a:ext cx="5121275" cy="3840162"/>
           </a:xfrm>
           <a:custGeom>
             <a:avLst/>
@@ -3099,25 +3312,19 @@
         </p:nvSpPr>
         <p:spPr>
           <a:xfrm>
-            <a:off x="664846" y="4678958"/>
-            <a:ext cx="5318759" cy="4432697"/>
+            <a:off x="709934" y="4861444"/>
+            <a:ext cx="5679439" cy="4605576"/>
           </a:xfrm>
           <a:prstGeom prst="rect">
             <a:avLst/>
           </a:prstGeom>
         </p:spPr>
         <p:txBody>
-          <a:bodyPr lIns="91425" tIns="91425" rIns="91425" bIns="91425" anchor="t" anchorCtr="0">
+          <a:bodyPr lIns="95604" tIns="95604" rIns="95604" bIns="95604" anchor="t" anchorCtr="0">
             <a:noAutofit/>
           </a:bodyPr>
           <a:lstStyle/>
           <a:p>
-            <a:pPr>
-              <a:spcBef>
-                <a:spcPts val="0"/>
-              </a:spcBef>
-              <a:buNone/>
-            </a:pPr>
             <a:endParaRPr/>
           </a:p>
         </p:txBody>
@@ -3135,7 +3342,7 @@
 </p:notes>
 </file>
 
-<file path=ppt/notesSlides/notesSlide6.xml><?xml version="1.0" encoding="utf-8"?>
+<file path=ppt/notesSlides/notesSlide8.xml><?xml version="1.0" encoding="utf-8"?>
 <p:notes xmlns:a="http://schemas.openxmlformats.org/drawingml/2006/main" xmlns:r="http://schemas.openxmlformats.org/officeDocument/2006/relationships" xmlns:p="http://schemas.openxmlformats.org/presentationml/2006/main" showMasterSp="0" showMasterPhAnim="0">
   <p:cSld>
     <p:spTree>
@@ -3164,8 +3371,8 @@
         </p:nvSpPr>
         <p:spPr>
           <a:xfrm>
-            <a:off x="862013" y="738188"/>
-            <a:ext cx="4924425" cy="3694112"/>
+            <a:off x="989013" y="766763"/>
+            <a:ext cx="5121275" cy="3840162"/>
           </a:xfrm>
           <a:custGeom>
             <a:avLst/>
@@ -3215,25 +3422,19 @@
         </p:nvSpPr>
         <p:spPr>
           <a:xfrm>
-            <a:off x="664846" y="4678958"/>
-            <a:ext cx="5318759" cy="4432697"/>
+            <a:off x="709934" y="4861444"/>
+            <a:ext cx="5679439" cy="4605576"/>
           </a:xfrm>
           <a:prstGeom prst="rect">
             <a:avLst/>
           </a:prstGeom>
         </p:spPr>
         <p:txBody>
-          <a:bodyPr lIns="91425" tIns="91425" rIns="91425" bIns="91425" anchor="t" anchorCtr="0">
+          <a:bodyPr lIns="95604" tIns="95604" rIns="95604" bIns="95604" anchor="t" anchorCtr="0">
             <a:noAutofit/>
           </a:bodyPr>
           <a:lstStyle/>
           <a:p>
-            <a:pPr>
-              <a:spcBef>
-                <a:spcPts val="0"/>
-              </a:spcBef>
-              <a:buNone/>
-            </a:pPr>
             <a:endParaRPr/>
           </a:p>
         </p:txBody>
@@ -3251,7 +3452,7 @@
 </p:notes>
 </file>
 
-<file path=ppt/notesSlides/notesSlide7.xml><?xml version="1.0" encoding="utf-8"?>
+<file path=ppt/notesSlides/notesSlide9.xml><?xml version="1.0" encoding="utf-8"?>
 <p:notes xmlns:a="http://schemas.openxmlformats.org/drawingml/2006/main" xmlns:r="http://schemas.openxmlformats.org/officeDocument/2006/relationships" xmlns:p="http://schemas.openxmlformats.org/presentationml/2006/main" showMasterSp="0" showMasterPhAnim="0">
   <p:cSld>
     <p:spTree>
@@ -3280,8 +3481,8 @@
         </p:nvSpPr>
         <p:spPr>
           <a:xfrm>
-            <a:off x="862013" y="738188"/>
-            <a:ext cx="4924425" cy="3694112"/>
+            <a:off x="989013" y="766763"/>
+            <a:ext cx="5121275" cy="3840162"/>
           </a:xfrm>
           <a:custGeom>
             <a:avLst/>
@@ -3331,25 +3532,19 @@
         </p:nvSpPr>
         <p:spPr>
           <a:xfrm>
-            <a:off x="664846" y="4678958"/>
-            <a:ext cx="5318759" cy="4432697"/>
+            <a:off x="709934" y="4861444"/>
+            <a:ext cx="5679439" cy="4605576"/>
           </a:xfrm>
           <a:prstGeom prst="rect">
             <a:avLst/>
           </a:prstGeom>
         </p:spPr>
         <p:txBody>
-          <a:bodyPr lIns="91425" tIns="91425" rIns="91425" bIns="91425" anchor="t" anchorCtr="0">
+          <a:bodyPr lIns="95604" tIns="95604" rIns="95604" bIns="95604" anchor="t" anchorCtr="0">
             <a:noAutofit/>
           </a:bodyPr>
           <a:lstStyle/>
           <a:p>
-            <a:pPr>
-              <a:spcBef>
-                <a:spcPts val="0"/>
-              </a:spcBef>
-              <a:buNone/>
-            </a:pPr>
             <a:endParaRPr/>
           </a:p>
         </p:txBody>
@@ -3358,238 +3553,6 @@
     <p:extLst>
       <p:ext uri="{BB962C8B-B14F-4D97-AF65-F5344CB8AC3E}">
         <p14:creationId xmlns:p14="http://schemas.microsoft.com/office/powerpoint/2010/main" val="3400241692"/>
-      </p:ext>
-    </p:extLst>
-  </p:cSld>
-  <p:clrMapOvr>
-    <a:masterClrMapping/>
-  </p:clrMapOvr>
-</p:notes>
-</file>
-
-<file path=ppt/notesSlides/notesSlide8.xml><?xml version="1.0" encoding="utf-8"?>
-<p:notes xmlns:a="http://schemas.openxmlformats.org/drawingml/2006/main" xmlns:r="http://schemas.openxmlformats.org/officeDocument/2006/relationships" xmlns:p="http://schemas.openxmlformats.org/presentationml/2006/main" showMasterSp="0" showMasterPhAnim="0">
-  <p:cSld>
-    <p:spTree>
-      <p:nvGrpSpPr>
-        <p:cNvPr id="1" name="Shape 85"/>
-        <p:cNvGrpSpPr/>
-        <p:nvPr/>
-      </p:nvGrpSpPr>
-      <p:grpSpPr>
-        <a:xfrm>
-          <a:off x="0" y="0"/>
-          <a:ext cx="0" cy="0"/>
-          <a:chOff x="0" y="0"/>
-          <a:chExt cx="0" cy="0"/>
-        </a:xfrm>
-      </p:grpSpPr>
-      <p:sp>
-        <p:nvSpPr>
-          <p:cNvPr id="86" name="Shape 86"/>
-          <p:cNvSpPr>
-            <a:spLocks noGrp="1" noRot="1" noChangeAspect="1"/>
-          </p:cNvSpPr>
-          <p:nvPr>
-            <p:ph type="sldImg" idx="2"/>
-          </p:nvPr>
-        </p:nvSpPr>
-        <p:spPr>
-          <a:xfrm>
-            <a:off x="862013" y="738188"/>
-            <a:ext cx="4924425" cy="3694112"/>
-          </a:xfrm>
-          <a:custGeom>
-            <a:avLst/>
-            <a:gdLst/>
-            <a:ahLst/>
-            <a:cxnLst/>
-            <a:rect l="0" t="0" r="0" b="0"/>
-            <a:pathLst>
-              <a:path w="120000" h="120000" extrusionOk="0">
-                <a:moveTo>
-                  <a:pt x="0" y="0"/>
-                </a:moveTo>
-                <a:lnTo>
-                  <a:pt x="120000" y="0"/>
-                </a:lnTo>
-                <a:lnTo>
-                  <a:pt x="120000" y="120000"/>
-                </a:lnTo>
-                <a:lnTo>
-                  <a:pt x="0" y="120000"/>
-                </a:lnTo>
-                <a:close/>
-              </a:path>
-            </a:pathLst>
-          </a:custGeom>
-          <a:noFill/>
-          <a:ln w="9525" cap="flat" cmpd="sng">
-            <a:solidFill>
-              <a:srgbClr val="000000"/>
-            </a:solidFill>
-            <a:prstDash val="solid"/>
-            <a:round/>
-            <a:headEnd type="none" w="med" len="med"/>
-            <a:tailEnd type="none" w="med" len="med"/>
-          </a:ln>
-        </p:spPr>
-      </p:sp>
-      <p:sp>
-        <p:nvSpPr>
-          <p:cNvPr id="87" name="Shape 87"/>
-          <p:cNvSpPr txBox="1">
-            <a:spLocks noGrp="1"/>
-          </p:cNvSpPr>
-          <p:nvPr>
-            <p:ph type="body" idx="1"/>
-          </p:nvPr>
-        </p:nvSpPr>
-        <p:spPr>
-          <a:xfrm>
-            <a:off x="664846" y="4678958"/>
-            <a:ext cx="5318759" cy="4432697"/>
-          </a:xfrm>
-          <a:prstGeom prst="rect">
-            <a:avLst/>
-          </a:prstGeom>
-        </p:spPr>
-        <p:txBody>
-          <a:bodyPr lIns="91425" tIns="91425" rIns="91425" bIns="91425" anchor="t" anchorCtr="0">
-            <a:noAutofit/>
-          </a:bodyPr>
-          <a:lstStyle/>
-          <a:p>
-            <a:pPr>
-              <a:spcBef>
-                <a:spcPts val="0"/>
-              </a:spcBef>
-              <a:buNone/>
-            </a:pPr>
-            <a:endParaRPr/>
-          </a:p>
-        </p:txBody>
-      </p:sp>
-    </p:spTree>
-    <p:extLst>
-      <p:ext uri="{BB962C8B-B14F-4D97-AF65-F5344CB8AC3E}">
-        <p14:creationId xmlns:p14="http://schemas.microsoft.com/office/powerpoint/2010/main" val="3489227445"/>
-      </p:ext>
-    </p:extLst>
-  </p:cSld>
-  <p:clrMapOvr>
-    <a:masterClrMapping/>
-  </p:clrMapOvr>
-</p:notes>
-</file>
-
-<file path=ppt/notesSlides/notesSlide9.xml><?xml version="1.0" encoding="utf-8"?>
-<p:notes xmlns:a="http://schemas.openxmlformats.org/drawingml/2006/main" xmlns:r="http://schemas.openxmlformats.org/officeDocument/2006/relationships" xmlns:p="http://schemas.openxmlformats.org/presentationml/2006/main" showMasterSp="0" showMasterPhAnim="0">
-  <p:cSld>
-    <p:spTree>
-      <p:nvGrpSpPr>
-        <p:cNvPr id="1" name="Shape 96"/>
-        <p:cNvGrpSpPr/>
-        <p:nvPr/>
-      </p:nvGrpSpPr>
-      <p:grpSpPr>
-        <a:xfrm>
-          <a:off x="0" y="0"/>
-          <a:ext cx="0" cy="0"/>
-          <a:chOff x="0" y="0"/>
-          <a:chExt cx="0" cy="0"/>
-        </a:xfrm>
-      </p:grpSpPr>
-      <p:sp>
-        <p:nvSpPr>
-          <p:cNvPr id="97" name="Shape 97"/>
-          <p:cNvSpPr>
-            <a:spLocks noGrp="1" noRot="1" noChangeAspect="1"/>
-          </p:cNvSpPr>
-          <p:nvPr>
-            <p:ph type="sldImg" idx="2"/>
-          </p:nvPr>
-        </p:nvSpPr>
-        <p:spPr>
-          <a:xfrm>
-            <a:off x="862013" y="738188"/>
-            <a:ext cx="4924425" cy="3694112"/>
-          </a:xfrm>
-          <a:custGeom>
-            <a:avLst/>
-            <a:gdLst/>
-            <a:ahLst/>
-            <a:cxnLst/>
-            <a:rect l="0" t="0" r="0" b="0"/>
-            <a:pathLst>
-              <a:path w="120000" h="120000" extrusionOk="0">
-                <a:moveTo>
-                  <a:pt x="0" y="0"/>
-                </a:moveTo>
-                <a:lnTo>
-                  <a:pt x="120000" y="0"/>
-                </a:lnTo>
-                <a:lnTo>
-                  <a:pt x="120000" y="120000"/>
-                </a:lnTo>
-                <a:lnTo>
-                  <a:pt x="0" y="120000"/>
-                </a:lnTo>
-                <a:close/>
-              </a:path>
-            </a:pathLst>
-          </a:custGeom>
-          <a:noFill/>
-          <a:ln w="9525" cap="flat" cmpd="sng">
-            <a:solidFill>
-              <a:srgbClr val="000000"/>
-            </a:solidFill>
-            <a:prstDash val="solid"/>
-            <a:round/>
-            <a:headEnd type="none" w="med" len="med"/>
-            <a:tailEnd type="none" w="med" len="med"/>
-          </a:ln>
-        </p:spPr>
-      </p:sp>
-      <p:sp>
-        <p:nvSpPr>
-          <p:cNvPr id="98" name="Shape 98"/>
-          <p:cNvSpPr txBox="1">
-            <a:spLocks noGrp="1"/>
-          </p:cNvSpPr>
-          <p:nvPr>
-            <p:ph type="body" idx="1"/>
-          </p:nvPr>
-        </p:nvSpPr>
-        <p:spPr>
-          <a:xfrm>
-            <a:off x="664846" y="4678958"/>
-            <a:ext cx="5318759" cy="4432697"/>
-          </a:xfrm>
-          <a:prstGeom prst="rect">
-            <a:avLst/>
-          </a:prstGeom>
-        </p:spPr>
-        <p:txBody>
-          <a:bodyPr lIns="91425" tIns="91425" rIns="91425" bIns="91425" anchor="t" anchorCtr="0">
-            <a:noAutofit/>
-          </a:bodyPr>
-          <a:lstStyle/>
-          <a:p>
-            <a:pPr>
-              <a:spcBef>
-                <a:spcPts val="0"/>
-              </a:spcBef>
-              <a:buNone/>
-            </a:pPr>
-            <a:endParaRPr/>
-          </a:p>
-        </p:txBody>
-      </p:sp>
-    </p:spTree>
-    <p:extLst>
-      <p:ext uri="{BB962C8B-B14F-4D97-AF65-F5344CB8AC3E}">
-        <p14:creationId xmlns:p14="http://schemas.microsoft.com/office/powerpoint/2010/main" val="3873086416"/>
       </p:ext>
     </p:extLst>
   </p:cSld>
@@ -6472,7 +6435,7 @@
   <p:cSld>
     <p:spTree>
       <p:nvGrpSpPr>
-        <p:cNvPr id="1" name="Shape 93"/>
+        <p:cNvPr id="1" name="Shape 82"/>
         <p:cNvGrpSpPr/>
         <p:nvPr/>
       </p:nvGrpSpPr>
@@ -6486,18 +6449,18 @@
       </p:grpSpPr>
       <p:sp>
         <p:nvSpPr>
-          <p:cNvPr id="94" name="Shape 94"/>
+          <p:cNvPr id="83" name="Shape 83"/>
           <p:cNvSpPr txBox="1">
             <a:spLocks noGrp="1"/>
           </p:cNvSpPr>
           <p:nvPr>
-            <p:ph type="title"/>
+            <p:ph type="ctrTitle"/>
           </p:nvPr>
         </p:nvSpPr>
         <p:spPr>
           <a:xfrm>
-            <a:off x="786150" y="410826"/>
-            <a:ext cx="7571700" cy="936899"/>
+            <a:off x="1546025" y="2034925"/>
+            <a:ext cx="5832600" cy="1546500"/>
           </a:xfrm>
           <a:prstGeom prst="rect">
             <a:avLst/>
@@ -6509,15 +6472,38 @@
           </a:bodyPr>
           <a:lstStyle/>
           <a:p>
-            <a:pPr>
+            <a:pPr rtl="0">
               <a:spcBef>
                 <a:spcPts val="0"/>
               </a:spcBef>
               <a:buNone/>
             </a:pPr>
             <a:r>
+              <a:rPr lang="en" sz="6000" dirty="0">
+                <a:solidFill>
+                  <a:srgbClr val="CFD8DC"/>
+                </a:solidFill>
+              </a:rPr>
+              <a:t>2</a:t>
+            </a:r>
+            <a:r>
+              <a:rPr lang="en" sz="6000" dirty="0" smtClean="0">
+                <a:solidFill>
+                  <a:srgbClr val="CFD8DC"/>
+                </a:solidFill>
+              </a:rPr>
+              <a:t>. </a:t>
+            </a:r>
+            <a:br>
+              <a:rPr lang="en" sz="6000" dirty="0" smtClean="0">
+                <a:solidFill>
+                  <a:srgbClr val="CFD8DC"/>
+                </a:solidFill>
+              </a:rPr>
+            </a:br>
+            <a:r>
               <a:rPr lang="en" dirty="0" smtClean="0"/>
-              <a:t>2.2 Porque ultilizar o Hadoop?</a:t>
+              <a:t>Hadoop</a:t>
             </a:r>
             <a:endParaRPr lang="en" dirty="0"/>
           </a:p>
@@ -6525,18 +6511,18 @@
       </p:sp>
       <p:sp>
         <p:nvSpPr>
-          <p:cNvPr id="95" name="Shape 95"/>
+          <p:cNvPr id="84" name="Shape 84"/>
           <p:cNvSpPr txBox="1">
             <a:spLocks noGrp="1"/>
           </p:cNvSpPr>
           <p:nvPr>
-            <p:ph type="body" idx="1"/>
+            <p:ph type="subTitle" idx="1"/>
           </p:nvPr>
         </p:nvSpPr>
         <p:spPr>
           <a:xfrm>
-            <a:off x="786150" y="1682266"/>
-            <a:ext cx="7571700" cy="4764899"/>
+            <a:off x="1546025" y="3424110"/>
+            <a:ext cx="5832600" cy="1046400"/>
           </a:xfrm>
           <a:prstGeom prst="rect">
             <a:avLst/>
@@ -6548,60 +6534,24 @@
           </a:bodyPr>
           <a:lstStyle/>
           <a:p>
-            <a:pPr marL="457200" lvl="0" indent="-228600" rtl="0">
-              <a:spcBef>
-                <a:spcPts val="0"/>
-              </a:spcBef>
+            <a:pPr lvl="0" rtl="0">
+              <a:spcBef>
+                <a:spcPts val="0"/>
+              </a:spcBef>
+              <a:buNone/>
             </a:pPr>
             <a:r>
               <a:rPr lang="en" dirty="0" smtClean="0"/>
-              <a:t>Código aberto fornecido de forma gratuíta.</a:t>
+              <a:t>HDFS e MapReduce</a:t>
             </a:r>
             <a:endParaRPr lang="en" dirty="0"/>
-          </a:p>
-          <a:p>
-            <a:pPr marL="457200" lvl="0" indent="-228600"/>
-            <a:r>
-              <a:rPr lang="pt-BR" dirty="0" smtClean="0"/>
-              <a:t>Trabalha de forma distribuída.</a:t>
-            </a:r>
-          </a:p>
-          <a:p>
-            <a:pPr marL="457200" lvl="0" indent="-228600"/>
-            <a:r>
-              <a:rPr lang="pt-BR" dirty="0" smtClean="0"/>
-              <a:t>Modelo de programação e Sistema de Arquivos próprio.</a:t>
-            </a:r>
-            <a:endParaRPr lang="en" dirty="0" smtClean="0"/>
-          </a:p>
-          <a:p>
-            <a:pPr marL="457200" lvl="0" indent="-228600" rtl="0">
-              <a:spcBef>
-                <a:spcPts val="0"/>
-              </a:spcBef>
-            </a:pPr>
-            <a:r>
-              <a:rPr lang="en" dirty="0" smtClean="0"/>
-              <a:t>Escalabilidade mais barata.</a:t>
-            </a:r>
-          </a:p>
-          <a:p>
-            <a:pPr marL="457200" lvl="0" indent="-228600" rtl="0">
-              <a:spcBef>
-                <a:spcPts val="0"/>
-              </a:spcBef>
-            </a:pPr>
-            <a:r>
-              <a:rPr lang="en" dirty="0" smtClean="0"/>
-              <a:t>A ferramenta mais ultilizada para tratamento de BigData.</a:t>
-            </a:r>
           </a:p>
         </p:txBody>
       </p:sp>
     </p:spTree>
     <p:extLst>
       <p:ext uri="{BB962C8B-B14F-4D97-AF65-F5344CB8AC3E}">
-        <p14:creationId xmlns:p14="http://schemas.microsoft.com/office/powerpoint/2010/main" val="121933470"/>
+        <p14:creationId xmlns:p14="http://schemas.microsoft.com/office/powerpoint/2010/main" val="3176358835"/>
       </p:ext>
     </p:extLst>
   </p:cSld>
@@ -6626,7 +6576,7 @@
   <p:cSld>
     <p:spTree>
       <p:nvGrpSpPr>
-        <p:cNvPr id="1" name="Shape 199"/>
+        <p:cNvPr id="1" name="Shape 93"/>
         <p:cNvGrpSpPr/>
         <p:nvPr/>
       </p:nvGrpSpPr>
@@ -6640,48 +6590,7 @@
       </p:grpSpPr>
       <p:sp>
         <p:nvSpPr>
-          <p:cNvPr id="200" name="Shape 200"/>
-          <p:cNvSpPr/>
-          <p:nvPr/>
-        </p:nvSpPr>
-        <p:spPr>
-          <a:xfrm>
-            <a:off x="1181273" y="2012535"/>
-            <a:ext cx="2236200" cy="2235899"/>
-          </a:xfrm>
-          <a:prstGeom prst="ellipse">
-            <a:avLst/>
-          </a:prstGeom>
-          <a:noFill/>
-          <a:ln w="9525" cap="flat" cmpd="sng">
-            <a:solidFill>
-              <a:srgbClr val="CFD8DC"/>
-            </a:solidFill>
-            <a:prstDash val="dash"/>
-            <a:round/>
-            <a:headEnd type="none" w="med" len="med"/>
-            <a:tailEnd type="none" w="med" len="med"/>
-          </a:ln>
-        </p:spPr>
-        <p:txBody>
-          <a:bodyPr lIns="91425" tIns="91425" rIns="91425" bIns="91425" anchor="ctr" anchorCtr="0">
-            <a:noAutofit/>
-          </a:bodyPr>
-          <a:lstStyle/>
-          <a:p>
-            <a:pPr>
-              <a:spcBef>
-                <a:spcPts val="0"/>
-              </a:spcBef>
-              <a:buNone/>
-            </a:pPr>
-            <a:endParaRPr/>
-          </a:p>
-        </p:txBody>
-      </p:sp>
-      <p:sp>
-        <p:nvSpPr>
-          <p:cNvPr id="201" name="Shape 201"/>
+          <p:cNvPr id="94" name="Shape 94"/>
           <p:cNvSpPr txBox="1">
             <a:spLocks noGrp="1"/>
           </p:cNvSpPr>
@@ -6704,7 +6613,7 @@
           </a:bodyPr>
           <a:lstStyle/>
           <a:p>
-            <a:pPr lvl="0" rtl="0">
+            <a:pPr>
               <a:spcBef>
                 <a:spcPts val="0"/>
               </a:spcBef>
@@ -6712,7 +6621,7 @@
             </a:pPr>
             <a:r>
               <a:rPr lang="en" dirty="0" smtClean="0"/>
-              <a:t>Existem concorrentes?</a:t>
+              <a:t>2.1 Oque é Hadoop?</a:t>
             </a:r>
             <a:endParaRPr lang="en" dirty="0"/>
           </a:p>
@@ -6720,217 +6629,71 @@
       </p:sp>
       <p:sp>
         <p:nvSpPr>
-          <p:cNvPr id="202" name="Shape 202"/>
-          <p:cNvSpPr/>
-          <p:nvPr/>
+          <p:cNvPr id="95" name="Shape 95"/>
+          <p:cNvSpPr txBox="1">
+            <a:spLocks noGrp="1"/>
+          </p:cNvSpPr>
+          <p:nvPr>
+            <p:ph type="body" idx="1"/>
+          </p:nvPr>
         </p:nvSpPr>
         <p:spPr>
           <a:xfrm>
-            <a:off x="1377722" y="2208985"/>
-            <a:ext cx="1842900" cy="1842900"/>
-          </a:xfrm>
-          <a:prstGeom prst="ellipse">
+            <a:off x="786150" y="1682266"/>
+            <a:ext cx="7571700" cy="4764899"/>
+          </a:xfrm>
+          <a:prstGeom prst="rect">
             <a:avLst/>
           </a:prstGeom>
-          <a:noFill/>
-          <a:ln w="9525" cap="flat" cmpd="sng">
-            <a:solidFill>
-              <a:srgbClr val="CFD8DC"/>
-            </a:solidFill>
-            <a:prstDash val="solid"/>
-            <a:round/>
-            <a:headEnd type="none" w="med" len="med"/>
-            <a:tailEnd type="none" w="med" len="med"/>
-          </a:ln>
         </p:spPr>
         <p:txBody>
-          <a:bodyPr lIns="91425" tIns="91425" rIns="91425" bIns="91425" anchor="ctr" anchorCtr="0">
+          <a:bodyPr lIns="91425" tIns="91425" rIns="91425" bIns="91425" anchor="t" anchorCtr="0">
             <a:noAutofit/>
           </a:bodyPr>
           <a:lstStyle/>
           <a:p>
-            <a:pPr algn="ctr">
-              <a:spcBef>
-                <a:spcPts val="0"/>
-              </a:spcBef>
-              <a:buNone/>
+            <a:pPr marL="457200" lvl="0" indent="-228600" rtl="0">
+              <a:spcBef>
+                <a:spcPts val="0"/>
+              </a:spcBef>
             </a:pPr>
             <a:r>
-              <a:rPr lang="en" sz="1800" b="1" dirty="0" smtClean="0">
-                <a:solidFill>
-                  <a:srgbClr val="263238"/>
-                </a:solidFill>
-                <a:latin typeface="Source Sans Pro"/>
-                <a:ea typeface="Source Sans Pro"/>
-                <a:cs typeface="Source Sans Pro"/>
-                <a:sym typeface="Source Sans Pro"/>
-              </a:rPr>
-              <a:t>Spark</a:t>
-            </a:r>
-          </a:p>
-          <a:p>
-            <a:pPr algn="ctr"/>
-            <a:r>
-              <a:rPr lang="pt-BR" sz="1800" dirty="0" err="1"/>
-              <a:t>Databricks</a:t>
-            </a:r>
-            <a:endParaRPr lang="en" sz="1800" b="1" dirty="0">
-              <a:solidFill>
-                <a:srgbClr val="263238"/>
-              </a:solidFill>
-              <a:latin typeface="Source Sans Pro"/>
-              <a:ea typeface="Source Sans Pro"/>
-              <a:cs typeface="Source Sans Pro"/>
-              <a:sym typeface="Source Sans Pro"/>
-            </a:endParaRPr>
+              <a:rPr lang="en" dirty="0" smtClean="0"/>
+              <a:t>Infraestrutura para o processamento distribuido de grandes massas de dados.</a:t>
+            </a:r>
+            <a:endParaRPr lang="en" dirty="0"/>
+          </a:p>
+          <a:p>
+            <a:pPr marL="457200" lvl="0" indent="-228600"/>
+            <a:r>
+              <a:rPr lang="pt-BR" dirty="0" smtClean="0"/>
+              <a:t>Desenvolvido pela Yahoo e atualmente mantido pela Apache Foundation</a:t>
+            </a:r>
+          </a:p>
+          <a:p>
+            <a:pPr marL="457200" lvl="0" indent="-228600"/>
+            <a:r>
+              <a:rPr lang="pt-BR" dirty="0" smtClean="0"/>
+              <a:t>Estrutura de código aberto que permite obter valor de dados estruturados e não estruturados.</a:t>
+            </a:r>
+            <a:endParaRPr lang="en" dirty="0" smtClean="0"/>
+          </a:p>
+          <a:p>
+            <a:pPr marL="457200" lvl="0" indent="-228600" rtl="0">
+              <a:spcBef>
+                <a:spcPts val="0"/>
+              </a:spcBef>
+            </a:pPr>
+            <a:endParaRPr lang="en" dirty="0"/>
           </a:p>
         </p:txBody>
       </p:sp>
-      <p:sp>
-        <p:nvSpPr>
-          <p:cNvPr id="203" name="Shape 203"/>
-          <p:cNvSpPr/>
-          <p:nvPr/>
-        </p:nvSpPr>
-        <p:spPr>
-          <a:xfrm>
-            <a:off x="5685098" y="1936510"/>
-            <a:ext cx="2399699" cy="2399399"/>
-          </a:xfrm>
-          <a:prstGeom prst="ellipse">
-            <a:avLst/>
-          </a:prstGeom>
-          <a:noFill/>
-          <a:ln w="9525" cap="flat" cmpd="sng">
-            <a:solidFill>
-              <a:srgbClr val="CFD8DC"/>
-            </a:solidFill>
-            <a:prstDash val="dash"/>
-            <a:round/>
-            <a:headEnd type="none" w="med" len="med"/>
-            <a:tailEnd type="none" w="med" len="med"/>
-          </a:ln>
-        </p:spPr>
-        <p:txBody>
-          <a:bodyPr lIns="91425" tIns="91425" rIns="91425" bIns="91425" anchor="ctr" anchorCtr="0">
-            <a:noAutofit/>
-          </a:bodyPr>
-          <a:lstStyle/>
-          <a:p>
-            <a:pPr>
-              <a:spcBef>
-                <a:spcPts val="0"/>
-              </a:spcBef>
-              <a:buNone/>
-            </a:pPr>
-            <a:endParaRPr/>
-          </a:p>
-        </p:txBody>
-      </p:sp>
-      <p:sp>
-        <p:nvSpPr>
-          <p:cNvPr id="204" name="Shape 204"/>
-          <p:cNvSpPr/>
-          <p:nvPr/>
-        </p:nvSpPr>
-        <p:spPr>
-          <a:xfrm>
-            <a:off x="5895923" y="2147335"/>
-            <a:ext cx="1977900" cy="1977900"/>
-          </a:xfrm>
-          <a:prstGeom prst="ellipse">
-            <a:avLst/>
-          </a:prstGeom>
-          <a:noFill/>
-          <a:ln w="28575" cap="flat" cmpd="sng">
-            <a:solidFill>
-              <a:srgbClr val="CFD8DC"/>
-            </a:solidFill>
-            <a:prstDash val="solid"/>
-            <a:round/>
-            <a:headEnd type="none" w="med" len="med"/>
-            <a:tailEnd type="none" w="med" len="med"/>
-          </a:ln>
-        </p:spPr>
-        <p:txBody>
-          <a:bodyPr lIns="91425" tIns="91425" rIns="91425" bIns="91425" anchor="ctr" anchorCtr="0">
-            <a:noAutofit/>
-          </a:bodyPr>
-          <a:lstStyle/>
-          <a:p>
-            <a:pPr algn="ctr"/>
-            <a:r>
-              <a:rPr lang="pt-BR" sz="1800" b="1" dirty="0" err="1" smtClean="0">
-                <a:solidFill>
-                  <a:srgbClr val="263238"/>
-                </a:solidFill>
-                <a:latin typeface="Source Sans Pro"/>
-                <a:ea typeface="Source Sans Pro"/>
-                <a:cs typeface="Source Sans Pro"/>
-                <a:sym typeface="Source Sans Pro"/>
-              </a:rPr>
-              <a:t>Metanautix</a:t>
-            </a:r>
-            <a:endParaRPr lang="pt-BR" sz="1800" b="1" dirty="0" smtClean="0">
-              <a:solidFill>
-                <a:srgbClr val="263238"/>
-              </a:solidFill>
-              <a:latin typeface="Source Sans Pro"/>
-              <a:ea typeface="Source Sans Pro"/>
-              <a:cs typeface="Source Sans Pro"/>
-              <a:sym typeface="Source Sans Pro"/>
-            </a:endParaRPr>
-          </a:p>
-          <a:p>
-            <a:pPr algn="ctr"/>
-            <a:r>
-              <a:rPr lang="pt-BR" sz="1800" dirty="0" smtClean="0">
-                <a:ea typeface="Source Sans Pro"/>
-              </a:rPr>
-              <a:t>Google</a:t>
-            </a:r>
-            <a:endParaRPr lang="en" sz="1800" b="1" dirty="0">
-              <a:solidFill>
-                <a:srgbClr val="263238"/>
-              </a:solidFill>
-              <a:latin typeface="Source Sans Pro"/>
-              <a:ea typeface="Source Sans Pro"/>
-              <a:cs typeface="Source Sans Pro"/>
-              <a:sym typeface="Source Sans Pro"/>
-            </a:endParaRPr>
-          </a:p>
-        </p:txBody>
-      </p:sp>
-      <p:cxnSp>
-        <p:nvCxnSpPr>
-          <p:cNvPr id="207" name="Shape 207"/>
-          <p:cNvCxnSpPr>
-            <a:stCxn id="202" idx="6"/>
-            <a:endCxn id="204" idx="2"/>
-          </p:cNvCxnSpPr>
-          <p:nvPr/>
-        </p:nvCxnSpPr>
-        <p:spPr>
-          <a:xfrm>
-            <a:off x="3220622" y="3130435"/>
-            <a:ext cx="2675301" cy="5850"/>
-          </a:xfrm>
-          <a:prstGeom prst="straightConnector1">
-            <a:avLst/>
-          </a:prstGeom>
-          <a:noFill/>
-          <a:ln w="9525" cap="flat" cmpd="sng">
-            <a:solidFill>
-              <a:srgbClr val="CFD8DC"/>
-            </a:solidFill>
-            <a:prstDash val="solid"/>
-            <a:round/>
-            <a:headEnd type="none" w="lg" len="lg"/>
-            <a:tailEnd type="none" w="lg" len="lg"/>
-          </a:ln>
-        </p:spPr>
-      </p:cxnSp>
     </p:spTree>
+    <p:extLst>
+      <p:ext uri="{BB962C8B-B14F-4D97-AF65-F5344CB8AC3E}">
+        <p14:creationId xmlns:p14="http://schemas.microsoft.com/office/powerpoint/2010/main" val="4243059255"/>
+      </p:ext>
+    </p:extLst>
   </p:cSld>
   <p:clrMapOvr>
     <a:masterClrMapping/>
@@ -6998,7 +6761,7 @@
             </a:pPr>
             <a:r>
               <a:rPr lang="en" dirty="0" smtClean="0"/>
-              <a:t>2.3 HDFS</a:t>
+              <a:t>2.2 Porque ultilizar o Hadoop?</a:t>
             </a:r>
             <a:endParaRPr lang="en" dirty="0"/>
           </a:p>
@@ -7016,7 +6779,7 @@
         </p:nvSpPr>
         <p:spPr>
           <a:xfrm>
-            <a:off x="786150" y="1563394"/>
+            <a:off x="786150" y="1682266"/>
             <a:ext cx="7571700" cy="4764899"/>
           </a:xfrm>
           <a:prstGeom prst="rect">
@@ -7035,25 +6798,25 @@
               </a:spcBef>
             </a:pPr>
             <a:r>
-              <a:rPr lang="en" sz="2800" dirty="0" smtClean="0"/>
-              <a:t>Sistema de arquivos distribuido do Hadoop.</a:t>
-            </a:r>
-            <a:endParaRPr lang="en" sz="2800" dirty="0"/>
+              <a:rPr lang="en" dirty="0" smtClean="0"/>
+              <a:t>Código aberto fornecido de forma gratuíta.</a:t>
+            </a:r>
+            <a:endParaRPr lang="en" dirty="0"/>
           </a:p>
           <a:p>
             <a:pPr marL="457200" lvl="0" indent="-228600"/>
             <a:r>
-              <a:rPr lang="pt-BR" sz="2800" dirty="0" smtClean="0"/>
-              <a:t>Otimizado para operações de leitura e gravação.</a:t>
+              <a:rPr lang="pt-BR" dirty="0" smtClean="0"/>
+              <a:t>Trabalha de forma distribuída.</a:t>
             </a:r>
           </a:p>
           <a:p>
             <a:pPr marL="457200" lvl="0" indent="-228600"/>
             <a:r>
-              <a:rPr lang="pt-BR" sz="2800" dirty="0" smtClean="0"/>
-              <a:t>Altamente escalável e disponível graças a replicação dos dados em vários Computadores.</a:t>
-            </a:r>
-            <a:endParaRPr lang="en" sz="2800" dirty="0" smtClean="0"/>
+              <a:rPr lang="pt-BR" dirty="0" smtClean="0"/>
+              <a:t>Modelo de programação e Sistema de Arquivos próprio.</a:t>
+            </a:r>
+            <a:endParaRPr lang="en" dirty="0" smtClean="0"/>
           </a:p>
           <a:p>
             <a:pPr marL="457200" lvl="0" indent="-228600" rtl="0">
@@ -7062,28 +6825,27 @@
               </a:spcBef>
             </a:pPr>
             <a:r>
-              <a:rPr lang="en" sz="2800" dirty="0" smtClean="0"/>
-              <a:t>Divide os arquivos em blocos normalmente de 64MB distribuindo o processamento em varias maquinas utilizando o MapReduce.</a:t>
-            </a:r>
-          </a:p>
-          <a:p>
-            <a:pPr marL="457200" indent="-228600"/>
-            <a:r>
-              <a:rPr lang="en" sz="2800" dirty="0"/>
-              <a:t>Tolerante a falhas de Hardware e Software</a:t>
-            </a:r>
-            <a:r>
-              <a:rPr lang="en" sz="2800" dirty="0" smtClean="0"/>
-              <a:t>.</a:t>
-            </a:r>
-            <a:endParaRPr lang="en" sz="2800" dirty="0"/>
+              <a:rPr lang="en" dirty="0" smtClean="0"/>
+              <a:t>Escalabilidade mais barata.</a:t>
+            </a:r>
+          </a:p>
+          <a:p>
+            <a:pPr marL="457200" lvl="0" indent="-228600" rtl="0">
+              <a:spcBef>
+                <a:spcPts val="0"/>
+              </a:spcBef>
+            </a:pPr>
+            <a:r>
+              <a:rPr lang="en" dirty="0" smtClean="0"/>
+              <a:t>A ferramenta mais ultilizada para tratamento de BigData.</a:t>
+            </a:r>
           </a:p>
         </p:txBody>
       </p:sp>
     </p:spTree>
     <p:extLst>
       <p:ext uri="{BB962C8B-B14F-4D97-AF65-F5344CB8AC3E}">
-        <p14:creationId xmlns:p14="http://schemas.microsoft.com/office/powerpoint/2010/main" val="2326395483"/>
+        <p14:creationId xmlns:p14="http://schemas.microsoft.com/office/powerpoint/2010/main" val="121933470"/>
       </p:ext>
     </p:extLst>
   </p:cSld>
@@ -7104,6 +6866,333 @@
 </file>
 
 <file path=ppt/slides/slide13.xml><?xml version="1.0" encoding="utf-8"?>
+<p:sld xmlns:a="http://schemas.openxmlformats.org/drawingml/2006/main" xmlns:r="http://schemas.openxmlformats.org/officeDocument/2006/relationships" xmlns:p="http://schemas.openxmlformats.org/presentationml/2006/main">
+  <p:cSld>
+    <p:spTree>
+      <p:nvGrpSpPr>
+        <p:cNvPr id="1" name="Shape 199"/>
+        <p:cNvGrpSpPr/>
+        <p:nvPr/>
+      </p:nvGrpSpPr>
+      <p:grpSpPr>
+        <a:xfrm>
+          <a:off x="0" y="0"/>
+          <a:ext cx="0" cy="0"/>
+          <a:chOff x="0" y="0"/>
+          <a:chExt cx="0" cy="0"/>
+        </a:xfrm>
+      </p:grpSpPr>
+      <p:sp>
+        <p:nvSpPr>
+          <p:cNvPr id="200" name="Shape 200"/>
+          <p:cNvSpPr/>
+          <p:nvPr/>
+        </p:nvSpPr>
+        <p:spPr>
+          <a:xfrm>
+            <a:off x="1181273" y="2012535"/>
+            <a:ext cx="2236200" cy="2235899"/>
+          </a:xfrm>
+          <a:prstGeom prst="ellipse">
+            <a:avLst/>
+          </a:prstGeom>
+          <a:noFill/>
+          <a:ln w="9525" cap="flat" cmpd="sng">
+            <a:solidFill>
+              <a:srgbClr val="CFD8DC"/>
+            </a:solidFill>
+            <a:prstDash val="dash"/>
+            <a:round/>
+            <a:headEnd type="none" w="med" len="med"/>
+            <a:tailEnd type="none" w="med" len="med"/>
+          </a:ln>
+        </p:spPr>
+        <p:txBody>
+          <a:bodyPr lIns="91425" tIns="91425" rIns="91425" bIns="91425" anchor="ctr" anchorCtr="0">
+            <a:noAutofit/>
+          </a:bodyPr>
+          <a:lstStyle/>
+          <a:p>
+            <a:pPr>
+              <a:spcBef>
+                <a:spcPts val="0"/>
+              </a:spcBef>
+              <a:buNone/>
+            </a:pPr>
+            <a:endParaRPr/>
+          </a:p>
+        </p:txBody>
+      </p:sp>
+      <p:sp>
+        <p:nvSpPr>
+          <p:cNvPr id="201" name="Shape 201"/>
+          <p:cNvSpPr txBox="1">
+            <a:spLocks noGrp="1"/>
+          </p:cNvSpPr>
+          <p:nvPr>
+            <p:ph type="title"/>
+          </p:nvPr>
+        </p:nvSpPr>
+        <p:spPr>
+          <a:xfrm>
+            <a:off x="786150" y="410826"/>
+            <a:ext cx="7571700" cy="936899"/>
+          </a:xfrm>
+          <a:prstGeom prst="rect">
+            <a:avLst/>
+          </a:prstGeom>
+        </p:spPr>
+        <p:txBody>
+          <a:bodyPr lIns="91425" tIns="91425" rIns="91425" bIns="91425" anchor="b" anchorCtr="0">
+            <a:noAutofit/>
+          </a:bodyPr>
+          <a:lstStyle/>
+          <a:p>
+            <a:pPr lvl="0" rtl="0">
+              <a:spcBef>
+                <a:spcPts val="0"/>
+              </a:spcBef>
+              <a:buNone/>
+            </a:pPr>
+            <a:r>
+              <a:rPr lang="en" dirty="0" smtClean="0"/>
+              <a:t>Existem concorrentes?</a:t>
+            </a:r>
+            <a:endParaRPr lang="en" dirty="0"/>
+          </a:p>
+        </p:txBody>
+      </p:sp>
+      <p:sp>
+        <p:nvSpPr>
+          <p:cNvPr id="202" name="Shape 202"/>
+          <p:cNvSpPr/>
+          <p:nvPr/>
+        </p:nvSpPr>
+        <p:spPr>
+          <a:xfrm>
+            <a:off x="1377722" y="2208985"/>
+            <a:ext cx="1842900" cy="1842900"/>
+          </a:xfrm>
+          <a:prstGeom prst="ellipse">
+            <a:avLst/>
+          </a:prstGeom>
+          <a:noFill/>
+          <a:ln w="9525" cap="flat" cmpd="sng">
+            <a:solidFill>
+              <a:srgbClr val="CFD8DC"/>
+            </a:solidFill>
+            <a:prstDash val="solid"/>
+            <a:round/>
+            <a:headEnd type="none" w="med" len="med"/>
+            <a:tailEnd type="none" w="med" len="med"/>
+          </a:ln>
+        </p:spPr>
+        <p:txBody>
+          <a:bodyPr lIns="91425" tIns="91425" rIns="91425" bIns="91425" anchor="ctr" anchorCtr="0">
+            <a:noAutofit/>
+          </a:bodyPr>
+          <a:lstStyle/>
+          <a:p>
+            <a:pPr algn="ctr">
+              <a:spcBef>
+                <a:spcPts val="0"/>
+              </a:spcBef>
+              <a:buNone/>
+            </a:pPr>
+            <a:r>
+              <a:rPr lang="en" sz="1800" b="1" dirty="0" smtClean="0">
+                <a:solidFill>
+                  <a:srgbClr val="263238"/>
+                </a:solidFill>
+                <a:latin typeface="Source Sans Pro"/>
+                <a:ea typeface="Source Sans Pro"/>
+                <a:cs typeface="Source Sans Pro"/>
+                <a:sym typeface="Source Sans Pro"/>
+              </a:rPr>
+              <a:t>Spark</a:t>
+            </a:r>
+          </a:p>
+          <a:p>
+            <a:pPr algn="ctr"/>
+            <a:r>
+              <a:rPr lang="pt-BR" sz="1800" dirty="0" err="1"/>
+              <a:t>Databricks</a:t>
+            </a:r>
+            <a:endParaRPr lang="en" sz="1800" b="1" dirty="0">
+              <a:solidFill>
+                <a:srgbClr val="263238"/>
+              </a:solidFill>
+              <a:latin typeface="Source Sans Pro"/>
+              <a:ea typeface="Source Sans Pro"/>
+              <a:cs typeface="Source Sans Pro"/>
+              <a:sym typeface="Source Sans Pro"/>
+            </a:endParaRPr>
+          </a:p>
+        </p:txBody>
+      </p:sp>
+      <p:sp>
+        <p:nvSpPr>
+          <p:cNvPr id="203" name="Shape 203"/>
+          <p:cNvSpPr/>
+          <p:nvPr/>
+        </p:nvSpPr>
+        <p:spPr>
+          <a:xfrm>
+            <a:off x="5685098" y="1936510"/>
+            <a:ext cx="2399699" cy="2399399"/>
+          </a:xfrm>
+          <a:prstGeom prst="ellipse">
+            <a:avLst/>
+          </a:prstGeom>
+          <a:noFill/>
+          <a:ln w="9525" cap="flat" cmpd="sng">
+            <a:solidFill>
+              <a:srgbClr val="CFD8DC"/>
+            </a:solidFill>
+            <a:prstDash val="dash"/>
+            <a:round/>
+            <a:headEnd type="none" w="med" len="med"/>
+            <a:tailEnd type="none" w="med" len="med"/>
+          </a:ln>
+        </p:spPr>
+        <p:txBody>
+          <a:bodyPr lIns="91425" tIns="91425" rIns="91425" bIns="91425" anchor="ctr" anchorCtr="0">
+            <a:noAutofit/>
+          </a:bodyPr>
+          <a:lstStyle/>
+          <a:p>
+            <a:pPr>
+              <a:spcBef>
+                <a:spcPts val="0"/>
+              </a:spcBef>
+              <a:buNone/>
+            </a:pPr>
+            <a:endParaRPr/>
+          </a:p>
+        </p:txBody>
+      </p:sp>
+      <p:sp>
+        <p:nvSpPr>
+          <p:cNvPr id="204" name="Shape 204"/>
+          <p:cNvSpPr/>
+          <p:nvPr/>
+        </p:nvSpPr>
+        <p:spPr>
+          <a:xfrm>
+            <a:off x="5895923" y="2147335"/>
+            <a:ext cx="1977900" cy="1977900"/>
+          </a:xfrm>
+          <a:prstGeom prst="ellipse">
+            <a:avLst/>
+          </a:prstGeom>
+          <a:noFill/>
+          <a:ln w="28575" cap="flat" cmpd="sng">
+            <a:solidFill>
+              <a:srgbClr val="CFD8DC"/>
+            </a:solidFill>
+            <a:prstDash val="solid"/>
+            <a:round/>
+            <a:headEnd type="none" w="med" len="med"/>
+            <a:tailEnd type="none" w="med" len="med"/>
+          </a:ln>
+        </p:spPr>
+        <p:txBody>
+          <a:bodyPr lIns="91425" tIns="91425" rIns="91425" bIns="91425" anchor="ctr" anchorCtr="0">
+            <a:noAutofit/>
+          </a:bodyPr>
+          <a:lstStyle/>
+          <a:p>
+            <a:pPr algn="ctr"/>
+            <a:r>
+              <a:rPr lang="pt-BR" sz="1800" b="1" dirty="0" err="1" smtClean="0">
+                <a:solidFill>
+                  <a:srgbClr val="263238"/>
+                </a:solidFill>
+                <a:latin typeface="Source Sans Pro"/>
+                <a:ea typeface="Source Sans Pro"/>
+                <a:cs typeface="Source Sans Pro"/>
+                <a:sym typeface="Source Sans Pro"/>
+              </a:rPr>
+              <a:t>Metanautix</a:t>
+            </a:r>
+            <a:endParaRPr lang="pt-BR" sz="1800" b="1" dirty="0" smtClean="0">
+              <a:solidFill>
+                <a:srgbClr val="263238"/>
+              </a:solidFill>
+              <a:latin typeface="Source Sans Pro"/>
+              <a:ea typeface="Source Sans Pro"/>
+              <a:cs typeface="Source Sans Pro"/>
+              <a:sym typeface="Source Sans Pro"/>
+            </a:endParaRPr>
+          </a:p>
+          <a:p>
+            <a:pPr algn="ctr"/>
+            <a:r>
+              <a:rPr lang="pt-BR" sz="1800" dirty="0" smtClean="0">
+                <a:ea typeface="Source Sans Pro"/>
+              </a:rPr>
+              <a:t>Google</a:t>
+            </a:r>
+            <a:endParaRPr lang="en" sz="1800" b="1" dirty="0">
+              <a:solidFill>
+                <a:srgbClr val="263238"/>
+              </a:solidFill>
+              <a:latin typeface="Source Sans Pro"/>
+              <a:ea typeface="Source Sans Pro"/>
+              <a:cs typeface="Source Sans Pro"/>
+              <a:sym typeface="Source Sans Pro"/>
+            </a:endParaRPr>
+          </a:p>
+        </p:txBody>
+      </p:sp>
+      <p:cxnSp>
+        <p:nvCxnSpPr>
+          <p:cNvPr id="207" name="Shape 207"/>
+          <p:cNvCxnSpPr>
+            <a:stCxn id="202" idx="6"/>
+            <a:endCxn id="204" idx="2"/>
+          </p:cNvCxnSpPr>
+          <p:nvPr/>
+        </p:nvCxnSpPr>
+        <p:spPr>
+          <a:xfrm>
+            <a:off x="3220622" y="3130435"/>
+            <a:ext cx="2675301" cy="5850"/>
+          </a:xfrm>
+          <a:prstGeom prst="straightConnector1">
+            <a:avLst/>
+          </a:prstGeom>
+          <a:noFill/>
+          <a:ln w="9525" cap="flat" cmpd="sng">
+            <a:solidFill>
+              <a:srgbClr val="CFD8DC"/>
+            </a:solidFill>
+            <a:prstDash val="solid"/>
+            <a:round/>
+            <a:headEnd type="none" w="lg" len="lg"/>
+            <a:tailEnd type="none" w="lg" len="lg"/>
+          </a:ln>
+        </p:spPr>
+      </p:cxnSp>
+    </p:spTree>
+  </p:cSld>
+  <p:clrMapOvr>
+    <a:masterClrMapping/>
+  </p:clrMapOvr>
+  <p:transition spd="slow">
+    <p:cut/>
+  </p:transition>
+  <p:timing>
+    <p:tnLst>
+      <p:par>
+        <p:cTn id="1" dur="indefinite" restart="never" nodeType="tmRoot"/>
+      </p:par>
+    </p:tnLst>
+  </p:timing>
+</p:sld>
+</file>
+
+<file path=ppt/slides/slide14.xml><?xml version="1.0" encoding="utf-8"?>
 <p:sld xmlns:a="http://schemas.openxmlformats.org/drawingml/2006/main" xmlns:r="http://schemas.openxmlformats.org/officeDocument/2006/relationships" xmlns:p="http://schemas.openxmlformats.org/presentationml/2006/main">
   <p:cSld>
     <p:spTree>
@@ -7153,7 +7242,7 @@
             </a:pPr>
             <a:r>
               <a:rPr lang="en" dirty="0" smtClean="0"/>
-              <a:t>2.4 MapReduce</a:t>
+              <a:t>2.3 HDFS</a:t>
             </a:r>
             <a:endParaRPr lang="en" dirty="0"/>
           </a:p>
@@ -7171,7 +7260,7 @@
         </p:nvSpPr>
         <p:spPr>
           <a:xfrm>
-            <a:off x="786150" y="1773706"/>
+            <a:off x="786150" y="1563394"/>
             <a:ext cx="7571700" cy="4764899"/>
           </a:xfrm>
           <a:prstGeom prst="rect">
@@ -7190,6 +7279,154 @@
               </a:spcBef>
             </a:pPr>
             <a:r>
+              <a:rPr lang="en" sz="2800" dirty="0" smtClean="0"/>
+              <a:t>Sistema de arquivos distribuido do Hadoop.</a:t>
+            </a:r>
+            <a:endParaRPr lang="en" sz="2800" dirty="0"/>
+          </a:p>
+          <a:p>
+            <a:pPr marL="457200" lvl="0" indent="-228600"/>
+            <a:r>
+              <a:rPr lang="pt-BR" sz="2800" dirty="0" smtClean="0"/>
+              <a:t>Otimizado para operações de leitura e gravação.</a:t>
+            </a:r>
+          </a:p>
+          <a:p>
+            <a:pPr marL="457200" lvl="0" indent="-228600"/>
+            <a:r>
+              <a:rPr lang="pt-BR" sz="2800" dirty="0" smtClean="0"/>
+              <a:t>Altamente escalável e disponível graças a replicação dos dados em vários Computadores.</a:t>
+            </a:r>
+            <a:endParaRPr lang="en" sz="2800" dirty="0" smtClean="0"/>
+          </a:p>
+          <a:p>
+            <a:pPr marL="457200" indent="-228600"/>
+            <a:r>
+              <a:rPr lang="en" sz="2800" dirty="0" smtClean="0"/>
+              <a:t>Tolerante </a:t>
+            </a:r>
+            <a:r>
+              <a:rPr lang="en" sz="2800" dirty="0"/>
+              <a:t>a falhas de Hardware e Software</a:t>
+            </a:r>
+            <a:r>
+              <a:rPr lang="en" sz="2800" dirty="0" smtClean="0"/>
+              <a:t>.</a:t>
+            </a:r>
+            <a:endParaRPr lang="en" sz="2800" dirty="0"/>
+          </a:p>
+        </p:txBody>
+      </p:sp>
+    </p:spTree>
+    <p:extLst>
+      <p:ext uri="{BB962C8B-B14F-4D97-AF65-F5344CB8AC3E}">
+        <p14:creationId xmlns:p14="http://schemas.microsoft.com/office/powerpoint/2010/main" val="2326395483"/>
+      </p:ext>
+    </p:extLst>
+  </p:cSld>
+  <p:clrMapOvr>
+    <a:masterClrMapping/>
+  </p:clrMapOvr>
+  <p:transition spd="slow">
+    <p:cut/>
+  </p:transition>
+  <p:timing>
+    <p:tnLst>
+      <p:par>
+        <p:cTn id="1" dur="indefinite" restart="never" nodeType="tmRoot"/>
+      </p:par>
+    </p:tnLst>
+  </p:timing>
+</p:sld>
+</file>
+
+<file path=ppt/slides/slide15.xml><?xml version="1.0" encoding="utf-8"?>
+<p:sld xmlns:a="http://schemas.openxmlformats.org/drawingml/2006/main" xmlns:r="http://schemas.openxmlformats.org/officeDocument/2006/relationships" xmlns:p="http://schemas.openxmlformats.org/presentationml/2006/main">
+  <p:cSld>
+    <p:spTree>
+      <p:nvGrpSpPr>
+        <p:cNvPr id="1" name="Shape 93"/>
+        <p:cNvGrpSpPr/>
+        <p:nvPr/>
+      </p:nvGrpSpPr>
+      <p:grpSpPr>
+        <a:xfrm>
+          <a:off x="0" y="0"/>
+          <a:ext cx="0" cy="0"/>
+          <a:chOff x="0" y="0"/>
+          <a:chExt cx="0" cy="0"/>
+        </a:xfrm>
+      </p:grpSpPr>
+      <p:sp>
+        <p:nvSpPr>
+          <p:cNvPr id="94" name="Shape 94"/>
+          <p:cNvSpPr txBox="1">
+            <a:spLocks noGrp="1"/>
+          </p:cNvSpPr>
+          <p:nvPr>
+            <p:ph type="title"/>
+          </p:nvPr>
+        </p:nvSpPr>
+        <p:spPr>
+          <a:xfrm>
+            <a:off x="786150" y="410826"/>
+            <a:ext cx="7571700" cy="936899"/>
+          </a:xfrm>
+          <a:prstGeom prst="rect">
+            <a:avLst/>
+          </a:prstGeom>
+        </p:spPr>
+        <p:txBody>
+          <a:bodyPr lIns="91425" tIns="91425" rIns="91425" bIns="91425" anchor="b" anchorCtr="0">
+            <a:noAutofit/>
+          </a:bodyPr>
+          <a:lstStyle/>
+          <a:p>
+            <a:pPr>
+              <a:spcBef>
+                <a:spcPts val="0"/>
+              </a:spcBef>
+              <a:buNone/>
+            </a:pPr>
+            <a:r>
+              <a:rPr lang="en" dirty="0" smtClean="0"/>
+              <a:t>2.4 MapReduce</a:t>
+            </a:r>
+            <a:endParaRPr lang="en" dirty="0"/>
+          </a:p>
+        </p:txBody>
+      </p:sp>
+      <p:sp>
+        <p:nvSpPr>
+          <p:cNvPr id="95" name="Shape 95"/>
+          <p:cNvSpPr txBox="1">
+            <a:spLocks noGrp="1"/>
+          </p:cNvSpPr>
+          <p:nvPr>
+            <p:ph type="body" idx="1"/>
+          </p:nvPr>
+        </p:nvSpPr>
+        <p:spPr>
+          <a:xfrm>
+            <a:off x="786150" y="1773706"/>
+            <a:ext cx="7571700" cy="4764899"/>
+          </a:xfrm>
+          <a:prstGeom prst="rect">
+            <a:avLst/>
+          </a:prstGeom>
+        </p:spPr>
+        <p:txBody>
+          <a:bodyPr lIns="91425" tIns="91425" rIns="91425" bIns="91425" anchor="t" anchorCtr="0">
+            <a:noAutofit/>
+          </a:bodyPr>
+          <a:lstStyle/>
+          <a:p>
+            <a:pPr marL="457200" lvl="0" indent="-228600" rtl="0">
+              <a:spcBef>
+                <a:spcPts val="0"/>
+              </a:spcBef>
+            </a:pPr>
+            <a:r>
               <a:rPr lang="en" dirty="0" smtClean="0"/>
               <a:t>Desenvolvido por dois engenheiros da Google.</a:t>
             </a:r>
@@ -7198,8 +7435,8 @@
           <a:p>
             <a:pPr marL="457200" lvl="0" indent="-228600"/>
             <a:r>
-              <a:rPr lang="pt-BR" dirty="0" smtClean="0"/>
-              <a:t>Permite separar uma grande massa de dados em pequenas partes e processar em maquinas diferentes.</a:t>
+              <a:rPr lang="en" dirty="0"/>
+              <a:t>Divide os arquivos em blocos normalmente de 64MB distribuindo o processamento em varias maquinas utilizando o MapReduce.</a:t>
             </a:r>
           </a:p>
           <a:p>
@@ -7235,7 +7472,7 @@
 </p:sld>
 </file>
 
-<file path=ppt/slides/slide14.xml><?xml version="1.0" encoding="utf-8"?>
+<file path=ppt/slides/slide16.xml><?xml version="1.0" encoding="utf-8"?>
 <p:sld xmlns:a="http://schemas.openxmlformats.org/drawingml/2006/main" xmlns:r="http://schemas.openxmlformats.org/officeDocument/2006/relationships" xmlns:p="http://schemas.openxmlformats.org/presentationml/2006/main">
   <p:cSld>
     <p:spTree>
@@ -7520,7 +7757,7 @@
 </p:sld>
 </file>
 
-<file path=ppt/slides/slide15.xml><?xml version="1.0" encoding="utf-8"?>
+<file path=ppt/slides/slide17.xml><?xml version="1.0" encoding="utf-8"?>
 <p:sld xmlns:a="http://schemas.openxmlformats.org/drawingml/2006/main" xmlns:r="http://schemas.openxmlformats.org/officeDocument/2006/relationships" xmlns:p="http://schemas.openxmlformats.org/presentationml/2006/main">
   <p:cSld>
     <p:bg>
@@ -7677,114 +7914,7 @@
 </p:sld>
 </file>
 
-<file path=ppt/slides/slide16.xml><?xml version="1.0" encoding="utf-8"?>
-<p:sld xmlns:a="http://schemas.openxmlformats.org/drawingml/2006/main" xmlns:r="http://schemas.openxmlformats.org/officeDocument/2006/relationships" xmlns:p="http://schemas.openxmlformats.org/presentationml/2006/main">
-  <p:cSld>
-    <p:spTree>
-      <p:nvGrpSpPr>
-        <p:cNvPr id="1" name="Shape 88"/>
-        <p:cNvGrpSpPr/>
-        <p:nvPr/>
-      </p:nvGrpSpPr>
-      <p:grpSpPr>
-        <a:xfrm>
-          <a:off x="0" y="0"/>
-          <a:ext cx="0" cy="0"/>
-          <a:chOff x="0" y="0"/>
-          <a:chExt cx="0" cy="0"/>
-        </a:xfrm>
-      </p:grpSpPr>
-      <p:sp>
-        <p:nvSpPr>
-          <p:cNvPr id="89" name="Shape 89"/>
-          <p:cNvSpPr txBox="1">
-            <a:spLocks noGrp="1"/>
-          </p:cNvSpPr>
-          <p:nvPr>
-            <p:ph type="body" idx="1"/>
-          </p:nvPr>
-        </p:nvSpPr>
-        <p:spPr>
-          <a:xfrm>
-            <a:off x="1215299" y="2920041"/>
-            <a:ext cx="6713399" cy="1093199"/>
-          </a:xfrm>
-          <a:prstGeom prst="rect">
-            <a:avLst/>
-          </a:prstGeom>
-        </p:spPr>
-        <p:txBody>
-          <a:bodyPr lIns="91425" tIns="91425" rIns="91425" bIns="91425" anchor="t" anchorCtr="0">
-            <a:noAutofit/>
-          </a:bodyPr>
-          <a:lstStyle/>
-          <a:p>
-            <a:pPr>
-              <a:buNone/>
-            </a:pPr>
-            <a:r>
-              <a:rPr lang="pt-BR" dirty="0"/>
-              <a:t>Auxiliar agricultores na tomada de decisão baseada em uma base de dados meteorológicos não estruturada, gerada a partir de um banco de dados relacional como BDMEP e PROTIN.</a:t>
-            </a:r>
-            <a:endParaRPr lang="en" dirty="0"/>
-          </a:p>
-        </p:txBody>
-      </p:sp>
-      <p:sp>
-        <p:nvSpPr>
-          <p:cNvPr id="2" name="Retângulo 1"/>
-          <p:cNvSpPr/>
-          <p:nvPr/>
-        </p:nvSpPr>
-        <p:spPr>
-          <a:xfrm>
-            <a:off x="3335923" y="2239790"/>
-            <a:ext cx="2472152" cy="523220"/>
-          </a:xfrm>
-          <a:prstGeom prst="rect">
-            <a:avLst/>
-          </a:prstGeom>
-        </p:spPr>
-        <p:txBody>
-          <a:bodyPr wrap="none">
-            <a:spAutoFit/>
-          </a:bodyPr>
-          <a:lstStyle/>
-          <a:p>
-            <a:r>
-              <a:rPr lang="en" sz="2800" b="1" dirty="0" smtClean="0">
-                <a:solidFill>
-                  <a:srgbClr val="0091EA"/>
-                </a:solidFill>
-                <a:latin typeface="Source Sans Pro" panose="020B0604020202020204" charset="0"/>
-              </a:rPr>
-              <a:t>Objetivo Geral</a:t>
-            </a:r>
-            <a:endParaRPr lang="pt-BR" sz="2800" dirty="0">
-              <a:latin typeface="Source Sans Pro" panose="020B0604020202020204" charset="0"/>
-            </a:endParaRPr>
-          </a:p>
-        </p:txBody>
-      </p:sp>
-    </p:spTree>
-  </p:cSld>
-  <p:clrMapOvr>
-    <a:masterClrMapping/>
-  </p:clrMapOvr>
-  <p:transition spd="slow">
-    <p:cut/>
-  </p:transition>
-  <p:timing>
-    <p:tnLst>
-      <p:par>
-        <p:cTn id="1" dur="indefinite" restart="never" nodeType="tmRoot"/>
-      </p:par>
-    </p:tnLst>
-  </p:timing>
-</p:sld>
-</file>
-
-<file path=ppt/slides/slide17.xml><?xml version="1.0" encoding="utf-8"?>
+<file path=ppt/slides/slide18.xml><?xml version="1.0" encoding="utf-8"?>
 <p:sld xmlns:a="http://schemas.openxmlformats.org/drawingml/2006/main" xmlns:r="http://schemas.openxmlformats.org/officeDocument/2006/relationships" xmlns:p="http://schemas.openxmlformats.org/presentationml/2006/main">
   <p:cSld>
     <p:spTree>
@@ -7923,7 +8053,7 @@
 </p:sld>
 </file>
 
-<file path=ppt/slides/slide18.xml><?xml version="1.0" encoding="utf-8"?>
+<file path=ppt/slides/slide19.xml><?xml version="1.0" encoding="utf-8"?>
 <p:sld xmlns:a="http://schemas.openxmlformats.org/drawingml/2006/main" xmlns:r="http://schemas.openxmlformats.org/officeDocument/2006/relationships" xmlns:p="http://schemas.openxmlformats.org/presentationml/2006/main">
   <p:cSld>
     <p:spTree>
@@ -8013,191 +8143,6 @@
     <p:extLst>
       <p:ext uri="{BB962C8B-B14F-4D97-AF65-F5344CB8AC3E}">
         <p14:creationId xmlns:p14="http://schemas.microsoft.com/office/powerpoint/2010/main" val="3373021240"/>
-      </p:ext>
-    </p:extLst>
-  </p:cSld>
-  <p:clrMapOvr>
-    <a:masterClrMapping/>
-  </p:clrMapOvr>
-  <p:transition spd="slow">
-    <p:cut/>
-  </p:transition>
-  <p:timing>
-    <p:tnLst>
-      <p:par>
-        <p:cTn id="1" dur="indefinite" restart="never" nodeType="tmRoot"/>
-      </p:par>
-    </p:tnLst>
-  </p:timing>
-</p:sld>
-</file>
-
-<file path=ppt/slides/slide19.xml><?xml version="1.0" encoding="utf-8"?>
-<p:sld xmlns:a="http://schemas.openxmlformats.org/drawingml/2006/main" xmlns:r="http://schemas.openxmlformats.org/officeDocument/2006/relationships" xmlns:p="http://schemas.openxmlformats.org/presentationml/2006/main">
-  <p:cSld>
-    <p:spTree>
-      <p:nvGrpSpPr>
-        <p:cNvPr id="1" name="Shape 93"/>
-        <p:cNvGrpSpPr/>
-        <p:nvPr/>
-      </p:nvGrpSpPr>
-      <p:grpSpPr>
-        <a:xfrm>
-          <a:off x="0" y="0"/>
-          <a:ext cx="0" cy="0"/>
-          <a:chOff x="0" y="0"/>
-          <a:chExt cx="0" cy="0"/>
-        </a:xfrm>
-      </p:grpSpPr>
-      <p:sp>
-        <p:nvSpPr>
-          <p:cNvPr id="94" name="Shape 94"/>
-          <p:cNvSpPr txBox="1">
-            <a:spLocks noGrp="1"/>
-          </p:cNvSpPr>
-          <p:nvPr>
-            <p:ph type="title"/>
-          </p:nvPr>
-        </p:nvSpPr>
-        <p:spPr>
-          <a:xfrm>
-            <a:off x="786150" y="410826"/>
-            <a:ext cx="7571700" cy="936899"/>
-          </a:xfrm>
-          <a:prstGeom prst="rect">
-            <a:avLst/>
-          </a:prstGeom>
-        </p:spPr>
-        <p:txBody>
-          <a:bodyPr lIns="91425" tIns="91425" rIns="91425" bIns="91425" anchor="b" anchorCtr="0">
-            <a:noAutofit/>
-          </a:bodyPr>
-          <a:lstStyle/>
-          <a:p>
-            <a:pPr>
-              <a:spcBef>
-                <a:spcPts val="0"/>
-              </a:spcBef>
-              <a:buNone/>
-            </a:pPr>
-            <a:r>
-              <a:rPr lang="en" dirty="0" smtClean="0"/>
-              <a:t>3.2 Aplicação Back-end</a:t>
-            </a:r>
-            <a:endParaRPr lang="en" dirty="0"/>
-          </a:p>
-        </p:txBody>
-      </p:sp>
-      <p:sp>
-        <p:nvSpPr>
-          <p:cNvPr id="95" name="Shape 95"/>
-          <p:cNvSpPr txBox="1">
-            <a:spLocks noGrp="1"/>
-          </p:cNvSpPr>
-          <p:nvPr>
-            <p:ph type="body" idx="1"/>
-          </p:nvPr>
-        </p:nvSpPr>
-        <p:spPr>
-          <a:xfrm>
-            <a:off x="786150" y="1773706"/>
-            <a:ext cx="7571700" cy="4764899"/>
-          </a:xfrm>
-          <a:prstGeom prst="rect">
-            <a:avLst/>
-          </a:prstGeom>
-        </p:spPr>
-        <p:txBody>
-          <a:bodyPr lIns="91425" tIns="91425" rIns="91425" bIns="91425" anchor="t" anchorCtr="0">
-            <a:noAutofit/>
-          </a:bodyPr>
-          <a:lstStyle/>
-          <a:p>
-            <a:pPr marL="457200" lvl="0" indent="-228600" rtl="0">
-              <a:spcBef>
-                <a:spcPts val="0"/>
-              </a:spcBef>
-            </a:pPr>
-            <a:r>
-              <a:rPr lang="en" sz="2500" dirty="0" smtClean="0"/>
-              <a:t>Classes Mappers para o mapeamento de dados.</a:t>
-            </a:r>
-            <a:endParaRPr lang="en" sz="2500" dirty="0"/>
-          </a:p>
-          <a:p>
-            <a:pPr marL="457200" lvl="0" indent="-228600"/>
-            <a:r>
-              <a:rPr lang="pt-BR" sz="2500" dirty="0" smtClean="0"/>
-              <a:t>Classes Reduces que recebem o resultado das classes de mapeamento e realizam a reduções.</a:t>
-            </a:r>
-          </a:p>
-          <a:p>
-            <a:pPr marL="457200" lvl="0" indent="-228600"/>
-            <a:r>
-              <a:rPr lang="pt-BR" sz="2500" dirty="0" smtClean="0"/>
-              <a:t>Classes </a:t>
-            </a:r>
-            <a:r>
-              <a:rPr lang="pt-BR" sz="2500" dirty="0" err="1" smtClean="0"/>
-              <a:t>MapReduces</a:t>
-            </a:r>
-            <a:r>
-              <a:rPr lang="pt-BR" sz="2500" dirty="0" smtClean="0"/>
-              <a:t> onde são </a:t>
-            </a:r>
-            <a:r>
-              <a:rPr lang="pt-BR" sz="2500" dirty="0" err="1" smtClean="0"/>
-              <a:t>setadas</a:t>
-            </a:r>
-            <a:r>
-              <a:rPr lang="pt-BR" sz="2500" dirty="0" smtClean="0"/>
-              <a:t> as configurações de acesso a infra e encapsuladas as classes de </a:t>
-            </a:r>
-            <a:r>
-              <a:rPr lang="pt-BR" sz="2500" dirty="0" err="1" smtClean="0"/>
-              <a:t>map</a:t>
-            </a:r>
-            <a:r>
-              <a:rPr lang="pt-BR" sz="2500" dirty="0" smtClean="0"/>
-              <a:t> e </a:t>
-            </a:r>
-            <a:r>
-              <a:rPr lang="pt-BR" sz="2500" dirty="0" err="1" smtClean="0"/>
-              <a:t>reduce</a:t>
-            </a:r>
-            <a:r>
-              <a:rPr lang="pt-BR" sz="2500" dirty="0" smtClean="0"/>
-              <a:t>.</a:t>
-            </a:r>
-          </a:p>
-          <a:p>
-            <a:pPr marL="457200" lvl="0" indent="-228600"/>
-            <a:r>
-              <a:rPr lang="pt-BR" sz="2500" dirty="0" smtClean="0"/>
-              <a:t>Classes de negócio que recebem o retorno dos servidores e tratam para a exibição na interface.</a:t>
-            </a:r>
-          </a:p>
-          <a:p>
-            <a:pPr marL="457200" lvl="0" indent="-228600"/>
-            <a:r>
-              <a:rPr lang="pt-BR" sz="2500" dirty="0" smtClean="0"/>
-              <a:t>Recursos </a:t>
-            </a:r>
-            <a:r>
-              <a:rPr lang="pt-BR" sz="2500" dirty="0" err="1" smtClean="0"/>
-              <a:t>RESTful</a:t>
-            </a:r>
-            <a:r>
-              <a:rPr lang="pt-BR" sz="2500" dirty="0" smtClean="0"/>
-              <a:t> utilizando a biblioteca Jersey.</a:t>
-            </a:r>
-          </a:p>
-        </p:txBody>
-      </p:sp>
-    </p:spTree>
-    <p:extLst>
-      <p:ext uri="{BB962C8B-B14F-4D97-AF65-F5344CB8AC3E}">
-        <p14:creationId xmlns:p14="http://schemas.microsoft.com/office/powerpoint/2010/main" val="2973657954"/>
       </p:ext>
     </p:extLst>
   </p:cSld>
@@ -8571,8 +8516,8 @@
         </p:nvSpPr>
         <p:spPr>
           <a:xfrm>
-            <a:off x="2412561" y="2504184"/>
-            <a:ext cx="4867038" cy="307777"/>
+            <a:off x="1362737" y="2418651"/>
+            <a:ext cx="6219972" cy="369332"/>
           </a:xfrm>
           <a:prstGeom prst="rect">
             <a:avLst/>
@@ -8585,30 +8530,30 @@
           <a:lstStyle/>
           <a:p>
             <a:r>
-              <a:rPr lang="en" b="1" dirty="0" smtClean="0"/>
+              <a:rPr lang="en" sz="1800" b="1" dirty="0" smtClean="0"/>
               <a:t>Orientadora: </a:t>
             </a:r>
             <a:r>
-              <a:rPr lang="pt-BR" b="1" dirty="0"/>
+              <a:rPr lang="pt-BR" sz="1800" b="1" dirty="0"/>
               <a:t>Prof.ª </a:t>
             </a:r>
             <a:r>
-              <a:rPr lang="pt-BR" b="1" dirty="0" err="1"/>
+              <a:rPr lang="pt-BR" sz="1800" b="1" dirty="0" err="1"/>
               <a:t>MSc</a:t>
             </a:r>
             <a:r>
-              <a:rPr lang="pt-BR" b="1" dirty="0"/>
+              <a:rPr lang="pt-BR" sz="1800" b="1" dirty="0"/>
               <a:t>. Edilene </a:t>
             </a:r>
             <a:r>
-              <a:rPr lang="pt-BR" b="1" dirty="0" err="1"/>
+              <a:rPr lang="pt-BR" sz="1800" b="1" dirty="0" err="1"/>
               <a:t>Veneruchi</a:t>
             </a:r>
             <a:r>
-              <a:rPr lang="pt-BR" b="1" dirty="0"/>
+              <a:rPr lang="pt-BR" sz="1800" b="1" dirty="0"/>
               <a:t> de Campos</a:t>
             </a:r>
-            <a:endParaRPr lang="en" b="1" dirty="0"/>
+            <a:endParaRPr lang="en" sz="1800" b="1" dirty="0"/>
           </a:p>
         </p:txBody>
       </p:sp>
@@ -8620,8 +8565,8 @@
         </p:nvSpPr>
         <p:spPr>
           <a:xfrm>
-            <a:off x="4018770" y="2732982"/>
-            <a:ext cx="3260829" cy="307777"/>
+            <a:off x="2455010" y="2706877"/>
+            <a:ext cx="4147289" cy="369332"/>
           </a:xfrm>
           <a:prstGeom prst="rect">
             <a:avLst/>
@@ -8634,10 +8579,10 @@
           <a:lstStyle/>
           <a:p>
             <a:r>
-              <a:rPr lang="en" b="1" dirty="0" smtClean="0"/>
+              <a:rPr lang="en" sz="1800" b="1" dirty="0" smtClean="0"/>
               <a:t>Universidade Anhanguera UNIDERP</a:t>
             </a:r>
-            <a:endParaRPr lang="en" dirty="0"/>
+            <a:endParaRPr lang="en" sz="1800" dirty="0"/>
           </a:p>
         </p:txBody>
       </p:sp>
@@ -8709,6 +8654,191 @@
             </a:pPr>
             <a:r>
               <a:rPr lang="en" dirty="0" smtClean="0"/>
+              <a:t>3.2 Aplicação Back-end</a:t>
+            </a:r>
+            <a:endParaRPr lang="en" dirty="0"/>
+          </a:p>
+        </p:txBody>
+      </p:sp>
+      <p:sp>
+        <p:nvSpPr>
+          <p:cNvPr id="95" name="Shape 95"/>
+          <p:cNvSpPr txBox="1">
+            <a:spLocks noGrp="1"/>
+          </p:cNvSpPr>
+          <p:nvPr>
+            <p:ph type="body" idx="1"/>
+          </p:nvPr>
+        </p:nvSpPr>
+        <p:spPr>
+          <a:xfrm>
+            <a:off x="786150" y="1773706"/>
+            <a:ext cx="7571700" cy="4764899"/>
+          </a:xfrm>
+          <a:prstGeom prst="rect">
+            <a:avLst/>
+          </a:prstGeom>
+        </p:spPr>
+        <p:txBody>
+          <a:bodyPr lIns="91425" tIns="91425" rIns="91425" bIns="91425" anchor="t" anchorCtr="0">
+            <a:noAutofit/>
+          </a:bodyPr>
+          <a:lstStyle/>
+          <a:p>
+            <a:pPr marL="457200" lvl="0" indent="-228600" rtl="0">
+              <a:spcBef>
+                <a:spcPts val="0"/>
+              </a:spcBef>
+            </a:pPr>
+            <a:r>
+              <a:rPr lang="en" sz="2500" dirty="0" smtClean="0"/>
+              <a:t>Classes Mappers para o mapeamento de dados.</a:t>
+            </a:r>
+            <a:endParaRPr lang="en" sz="2500" dirty="0"/>
+          </a:p>
+          <a:p>
+            <a:pPr marL="457200" lvl="0" indent="-228600"/>
+            <a:r>
+              <a:rPr lang="pt-BR" sz="2500" dirty="0" smtClean="0"/>
+              <a:t>Classes Reduces que recebem o resultado das classes de mapeamento e realizam a reduções.</a:t>
+            </a:r>
+          </a:p>
+          <a:p>
+            <a:pPr marL="457200" lvl="0" indent="-228600"/>
+            <a:r>
+              <a:rPr lang="pt-BR" sz="2500" dirty="0" smtClean="0"/>
+              <a:t>Classes </a:t>
+            </a:r>
+            <a:r>
+              <a:rPr lang="pt-BR" sz="2500" dirty="0" err="1" smtClean="0"/>
+              <a:t>MapReduces</a:t>
+            </a:r>
+            <a:r>
+              <a:rPr lang="pt-BR" sz="2500" dirty="0" smtClean="0"/>
+              <a:t> onde são </a:t>
+            </a:r>
+            <a:r>
+              <a:rPr lang="pt-BR" sz="2500" dirty="0" err="1" smtClean="0"/>
+              <a:t>setadas</a:t>
+            </a:r>
+            <a:r>
+              <a:rPr lang="pt-BR" sz="2500" dirty="0" smtClean="0"/>
+              <a:t> as configurações de acesso a infra e encapsuladas as classes de </a:t>
+            </a:r>
+            <a:r>
+              <a:rPr lang="pt-BR" sz="2500" dirty="0" err="1" smtClean="0"/>
+              <a:t>map</a:t>
+            </a:r>
+            <a:r>
+              <a:rPr lang="pt-BR" sz="2500" dirty="0" smtClean="0"/>
+              <a:t> e </a:t>
+            </a:r>
+            <a:r>
+              <a:rPr lang="pt-BR" sz="2500" dirty="0" err="1" smtClean="0"/>
+              <a:t>reduce</a:t>
+            </a:r>
+            <a:r>
+              <a:rPr lang="pt-BR" sz="2500" dirty="0" smtClean="0"/>
+              <a:t>.</a:t>
+            </a:r>
+          </a:p>
+          <a:p>
+            <a:pPr marL="457200" lvl="0" indent="-228600"/>
+            <a:r>
+              <a:rPr lang="pt-BR" sz="2500" dirty="0" smtClean="0"/>
+              <a:t>Classes de negócio que recebem o retorno dos servidores e tratam para a exibição na interface.</a:t>
+            </a:r>
+          </a:p>
+          <a:p>
+            <a:pPr marL="457200" lvl="0" indent="-228600"/>
+            <a:r>
+              <a:rPr lang="pt-BR" sz="2500" dirty="0" smtClean="0"/>
+              <a:t>Recursos </a:t>
+            </a:r>
+            <a:r>
+              <a:rPr lang="pt-BR" sz="2500" dirty="0" err="1" smtClean="0"/>
+              <a:t>RESTful</a:t>
+            </a:r>
+            <a:r>
+              <a:rPr lang="pt-BR" sz="2500" dirty="0" smtClean="0"/>
+              <a:t> utilizando a biblioteca Jersey.</a:t>
+            </a:r>
+          </a:p>
+        </p:txBody>
+      </p:sp>
+    </p:spTree>
+    <p:extLst>
+      <p:ext uri="{BB962C8B-B14F-4D97-AF65-F5344CB8AC3E}">
+        <p14:creationId xmlns:p14="http://schemas.microsoft.com/office/powerpoint/2010/main" val="2973657954"/>
+      </p:ext>
+    </p:extLst>
+  </p:cSld>
+  <p:clrMapOvr>
+    <a:masterClrMapping/>
+  </p:clrMapOvr>
+  <p:transition spd="slow">
+    <p:cut/>
+  </p:transition>
+  <p:timing>
+    <p:tnLst>
+      <p:par>
+        <p:cTn id="1" dur="indefinite" restart="never" nodeType="tmRoot"/>
+      </p:par>
+    </p:tnLst>
+  </p:timing>
+</p:sld>
+</file>
+
+<file path=ppt/slides/slide21.xml><?xml version="1.0" encoding="utf-8"?>
+<p:sld xmlns:a="http://schemas.openxmlformats.org/drawingml/2006/main" xmlns:r="http://schemas.openxmlformats.org/officeDocument/2006/relationships" xmlns:p="http://schemas.openxmlformats.org/presentationml/2006/main">
+  <p:cSld>
+    <p:spTree>
+      <p:nvGrpSpPr>
+        <p:cNvPr id="1" name="Shape 93"/>
+        <p:cNvGrpSpPr/>
+        <p:nvPr/>
+      </p:nvGrpSpPr>
+      <p:grpSpPr>
+        <a:xfrm>
+          <a:off x="0" y="0"/>
+          <a:ext cx="0" cy="0"/>
+          <a:chOff x="0" y="0"/>
+          <a:chExt cx="0" cy="0"/>
+        </a:xfrm>
+      </p:grpSpPr>
+      <p:sp>
+        <p:nvSpPr>
+          <p:cNvPr id="94" name="Shape 94"/>
+          <p:cNvSpPr txBox="1">
+            <a:spLocks noGrp="1"/>
+          </p:cNvSpPr>
+          <p:nvPr>
+            <p:ph type="title"/>
+          </p:nvPr>
+        </p:nvSpPr>
+        <p:spPr>
+          <a:xfrm>
+            <a:off x="786150" y="410826"/>
+            <a:ext cx="7571700" cy="936899"/>
+          </a:xfrm>
+          <a:prstGeom prst="rect">
+            <a:avLst/>
+          </a:prstGeom>
+        </p:spPr>
+        <p:txBody>
+          <a:bodyPr lIns="91425" tIns="91425" rIns="91425" bIns="91425" anchor="b" anchorCtr="0">
+            <a:noAutofit/>
+          </a:bodyPr>
+          <a:lstStyle/>
+          <a:p>
+            <a:pPr>
+              <a:spcBef>
+                <a:spcPts val="0"/>
+              </a:spcBef>
+              <a:buNone/>
+            </a:pPr>
+            <a:r>
+              <a:rPr lang="en" dirty="0" smtClean="0"/>
               <a:t>3.3 Aplicação Front-end</a:t>
             </a:r>
             <a:endParaRPr lang="en" dirty="0"/>
@@ -8810,7 +8940,7 @@
 </p:sld>
 </file>
 
-<file path=ppt/slides/slide21.xml><?xml version="1.0" encoding="utf-8"?>
+<file path=ppt/slides/slide22.xml><?xml version="1.0" encoding="utf-8"?>
 <p:sld xmlns:a="http://schemas.openxmlformats.org/drawingml/2006/main" xmlns:r="http://schemas.openxmlformats.org/officeDocument/2006/relationships" xmlns:p="http://schemas.openxmlformats.org/presentationml/2006/main">
   <p:cSld>
     <p:spTree>
@@ -8919,7 +9049,7 @@
 </p:sld>
 </file>
 
-<file path=ppt/slides/slide22.xml><?xml version="1.0" encoding="utf-8"?>
+<file path=ppt/slides/slide23.xml><?xml version="1.0" encoding="utf-8"?>
 <p:sld xmlns:a="http://schemas.openxmlformats.org/drawingml/2006/main" xmlns:r="http://schemas.openxmlformats.org/officeDocument/2006/relationships" xmlns:p="http://schemas.openxmlformats.org/presentationml/2006/main">
   <p:cSld>
     <p:bg>
@@ -11290,7 +11420,7 @@
 </p:sld>
 </file>
 
-<file path=ppt/slides/slide23.xml><?xml version="1.0" encoding="utf-8"?>
+<file path=ppt/slides/slide24.xml><?xml version="1.0" encoding="utf-8"?>
 <p:sld xmlns:a="http://schemas.openxmlformats.org/drawingml/2006/main" xmlns:r="http://schemas.openxmlformats.org/officeDocument/2006/relationships" xmlns:p="http://schemas.openxmlformats.org/presentationml/2006/main">
   <p:cSld>
     <p:spTree>
@@ -11931,7 +12061,7 @@
 </p:sld>
 </file>
 
-<file path=ppt/slides/slide24.xml><?xml version="1.0" encoding="utf-8"?>
+<file path=ppt/slides/slide25.xml><?xml version="1.0" encoding="utf-8"?>
 <p:sld xmlns:a="http://schemas.openxmlformats.org/drawingml/2006/main" xmlns:r="http://schemas.openxmlformats.org/officeDocument/2006/relationships" xmlns:p="http://schemas.openxmlformats.org/presentationml/2006/main">
   <p:cSld>
     <p:spTree>
@@ -13411,7 +13541,7 @@
 </p:sld>
 </file>
 
-<file path=ppt/slides/slide25.xml><?xml version="1.0" encoding="utf-8"?>
+<file path=ppt/slides/slide26.xml><?xml version="1.0" encoding="utf-8"?>
 <p:sld xmlns:a="http://schemas.openxmlformats.org/drawingml/2006/main" xmlns:r="http://schemas.openxmlformats.org/officeDocument/2006/relationships" xmlns:p="http://schemas.openxmlformats.org/presentationml/2006/main">
   <p:cSld>
     <p:spTree>
@@ -13854,6 +13984,230 @@
   <p:cSld>
     <p:spTree>
       <p:nvGrpSpPr>
+        <p:cNvPr id="1" name="Shape 88"/>
+        <p:cNvGrpSpPr/>
+        <p:nvPr/>
+      </p:nvGrpSpPr>
+      <p:grpSpPr>
+        <a:xfrm>
+          <a:off x="0" y="0"/>
+          <a:ext cx="0" cy="0"/>
+          <a:chOff x="0" y="0"/>
+          <a:chExt cx="0" cy="0"/>
+        </a:xfrm>
+      </p:grpSpPr>
+      <p:sp>
+        <p:nvSpPr>
+          <p:cNvPr id="89" name="Shape 89"/>
+          <p:cNvSpPr txBox="1">
+            <a:spLocks noGrp="1"/>
+          </p:cNvSpPr>
+          <p:nvPr>
+            <p:ph type="body" idx="1"/>
+          </p:nvPr>
+        </p:nvSpPr>
+        <p:spPr>
+          <a:xfrm>
+            <a:off x="1215299" y="2920041"/>
+            <a:ext cx="6713399" cy="3337540"/>
+          </a:xfrm>
+          <a:prstGeom prst="rect">
+            <a:avLst/>
+          </a:prstGeom>
+        </p:spPr>
+        <p:txBody>
+          <a:bodyPr lIns="91425" tIns="91425" rIns="91425" bIns="91425" anchor="t" anchorCtr="0">
+            <a:noAutofit/>
+          </a:bodyPr>
+          <a:lstStyle/>
+          <a:p>
+            <a:pPr>
+              <a:buNone/>
+            </a:pPr>
+            <a:r>
+              <a:rPr lang="pt-BR" dirty="0" smtClean="0"/>
+              <a:t>A Imprevisibilidade </a:t>
+            </a:r>
+            <a:r>
+              <a:rPr lang="pt-BR" dirty="0"/>
+              <a:t>do </a:t>
+            </a:r>
+            <a:r>
+              <a:rPr lang="pt-BR" dirty="0" smtClean="0"/>
+              <a:t>tempo atrapalha o planejamento e desenvolvimento dos agronegócios causando perdas irreversíveis.</a:t>
+            </a:r>
+            <a:endParaRPr lang="en" dirty="0"/>
+          </a:p>
+        </p:txBody>
+      </p:sp>
+      <p:sp>
+        <p:nvSpPr>
+          <p:cNvPr id="2" name="Retângulo 1"/>
+          <p:cNvSpPr/>
+          <p:nvPr/>
+        </p:nvSpPr>
+        <p:spPr>
+          <a:xfrm>
+            <a:off x="3703010" y="2272841"/>
+            <a:ext cx="1737976" cy="523220"/>
+          </a:xfrm>
+          <a:prstGeom prst="rect">
+            <a:avLst/>
+          </a:prstGeom>
+        </p:spPr>
+        <p:txBody>
+          <a:bodyPr wrap="none">
+            <a:spAutoFit/>
+          </a:bodyPr>
+          <a:lstStyle/>
+          <a:p>
+            <a:r>
+              <a:rPr lang="en" sz="2800" b="1" dirty="0" smtClean="0">
+                <a:solidFill>
+                  <a:srgbClr val="0091EA"/>
+                </a:solidFill>
+                <a:latin typeface="Source Sans Pro" panose="020B0604020202020204" charset="0"/>
+              </a:rPr>
+              <a:t>Problema</a:t>
+            </a:r>
+          </a:p>
+        </p:txBody>
+      </p:sp>
+    </p:spTree>
+    <p:extLst>
+      <p:ext uri="{BB962C8B-B14F-4D97-AF65-F5344CB8AC3E}">
+        <p14:creationId xmlns:p14="http://schemas.microsoft.com/office/powerpoint/2010/main" val="437975981"/>
+      </p:ext>
+    </p:extLst>
+  </p:cSld>
+  <p:clrMapOvr>
+    <a:masterClrMapping/>
+  </p:clrMapOvr>
+  <p:transition spd="slow">
+    <p:cut/>
+  </p:transition>
+  <p:timing>
+    <p:tnLst>
+      <p:par>
+        <p:cTn id="1" dur="indefinite" restart="never" nodeType="tmRoot"/>
+      </p:par>
+    </p:tnLst>
+  </p:timing>
+</p:sld>
+</file>
+
+<file path=ppt/slides/slide5.xml><?xml version="1.0" encoding="utf-8"?>
+<p:sld xmlns:a="http://schemas.openxmlformats.org/drawingml/2006/main" xmlns:r="http://schemas.openxmlformats.org/officeDocument/2006/relationships" xmlns:p="http://schemas.openxmlformats.org/presentationml/2006/main">
+  <p:cSld>
+    <p:spTree>
+      <p:nvGrpSpPr>
+        <p:cNvPr id="1" name="Shape 88"/>
+        <p:cNvGrpSpPr/>
+        <p:nvPr/>
+      </p:nvGrpSpPr>
+      <p:grpSpPr>
+        <a:xfrm>
+          <a:off x="0" y="0"/>
+          <a:ext cx="0" cy="0"/>
+          <a:chOff x="0" y="0"/>
+          <a:chExt cx="0" cy="0"/>
+        </a:xfrm>
+      </p:grpSpPr>
+      <p:sp>
+        <p:nvSpPr>
+          <p:cNvPr id="89" name="Shape 89"/>
+          <p:cNvSpPr txBox="1">
+            <a:spLocks noGrp="1"/>
+          </p:cNvSpPr>
+          <p:nvPr>
+            <p:ph type="body" idx="1"/>
+          </p:nvPr>
+        </p:nvSpPr>
+        <p:spPr>
+          <a:xfrm>
+            <a:off x="1215299" y="2920041"/>
+            <a:ext cx="6713399" cy="1093199"/>
+          </a:xfrm>
+          <a:prstGeom prst="rect">
+            <a:avLst/>
+          </a:prstGeom>
+        </p:spPr>
+        <p:txBody>
+          <a:bodyPr lIns="91425" tIns="91425" rIns="91425" bIns="91425" anchor="t" anchorCtr="0">
+            <a:noAutofit/>
+          </a:bodyPr>
+          <a:lstStyle/>
+          <a:p>
+            <a:pPr>
+              <a:buNone/>
+            </a:pPr>
+            <a:r>
+              <a:rPr lang="pt-BR" dirty="0"/>
+              <a:t>Auxiliar agricultores na tomada de decisão baseada em uma base de dados meteorológicos não estruturada, gerada a partir de um banco de dados relacional como BDMEP e PROTIN.</a:t>
+            </a:r>
+            <a:endParaRPr lang="en" dirty="0"/>
+          </a:p>
+        </p:txBody>
+      </p:sp>
+      <p:sp>
+        <p:nvSpPr>
+          <p:cNvPr id="2" name="Retângulo 1"/>
+          <p:cNvSpPr/>
+          <p:nvPr/>
+        </p:nvSpPr>
+        <p:spPr>
+          <a:xfrm>
+            <a:off x="3335923" y="2239790"/>
+            <a:ext cx="2472152" cy="523220"/>
+          </a:xfrm>
+          <a:prstGeom prst="rect">
+            <a:avLst/>
+          </a:prstGeom>
+        </p:spPr>
+        <p:txBody>
+          <a:bodyPr wrap="none">
+            <a:spAutoFit/>
+          </a:bodyPr>
+          <a:lstStyle/>
+          <a:p>
+            <a:r>
+              <a:rPr lang="en" sz="2800" b="1" dirty="0" smtClean="0">
+                <a:solidFill>
+                  <a:srgbClr val="0091EA"/>
+                </a:solidFill>
+                <a:latin typeface="Source Sans Pro" panose="020B0604020202020204" charset="0"/>
+              </a:rPr>
+              <a:t>Objetivo Geral</a:t>
+            </a:r>
+            <a:endParaRPr lang="pt-BR" sz="2800" dirty="0">
+              <a:latin typeface="Source Sans Pro" panose="020B0604020202020204" charset="0"/>
+            </a:endParaRPr>
+          </a:p>
+        </p:txBody>
+      </p:sp>
+    </p:spTree>
+  </p:cSld>
+  <p:clrMapOvr>
+    <a:masterClrMapping/>
+  </p:clrMapOvr>
+  <p:transition spd="slow">
+    <p:cut/>
+  </p:transition>
+  <p:timing>
+    <p:tnLst>
+      <p:par>
+        <p:cTn id="1" dur="indefinite" restart="never" nodeType="tmRoot"/>
+      </p:par>
+    </p:tnLst>
+  </p:timing>
+</p:sld>
+</file>
+
+<file path=ppt/slides/slide6.xml><?xml version="1.0" encoding="utf-8"?>
+<p:sld xmlns:a="http://schemas.openxmlformats.org/drawingml/2006/main" xmlns:r="http://schemas.openxmlformats.org/officeDocument/2006/relationships" xmlns:p="http://schemas.openxmlformats.org/presentationml/2006/main">
+  <p:cSld>
+    <p:spTree>
+      <p:nvGrpSpPr>
         <p:cNvPr id="1" name="Shape 82"/>
         <p:cNvGrpSpPr/>
         <p:nvPr/>
@@ -13977,7 +14331,7 @@
 </p:sld>
 </file>
 
-<file path=ppt/slides/slide5.xml><?xml version="1.0" encoding="utf-8"?>
+<file path=ppt/slides/slide7.xml><?xml version="1.0" encoding="utf-8"?>
 <p:sld xmlns:a="http://schemas.openxmlformats.org/drawingml/2006/main" xmlns:r="http://schemas.openxmlformats.org/officeDocument/2006/relationships" xmlns:p="http://schemas.openxmlformats.org/presentationml/2006/main">
   <p:cSld>
     <p:spTree>
@@ -14121,7 +14475,7 @@
 </p:sld>
 </file>
 
-<file path=ppt/slides/slide6.xml><?xml version="1.0" encoding="utf-8"?>
+<file path=ppt/slides/slide8.xml><?xml version="1.0" encoding="utf-8"?>
 <p:sld xmlns:a="http://schemas.openxmlformats.org/drawingml/2006/main" xmlns:r="http://schemas.openxmlformats.org/officeDocument/2006/relationships" xmlns:p="http://schemas.openxmlformats.org/presentationml/2006/main">
   <p:cSld>
     <p:spTree>
@@ -15058,7 +15412,7 @@
 </p:sld>
 </file>
 
-<file path=ppt/slides/slide7.xml><?xml version="1.0" encoding="utf-8"?>
+<file path=ppt/slides/slide9.xml><?xml version="1.0" encoding="utf-8"?>
 <p:sld xmlns:a="http://schemas.openxmlformats.org/drawingml/2006/main" xmlns:r="http://schemas.openxmlformats.org/officeDocument/2006/relationships" xmlns:p="http://schemas.openxmlformats.org/presentationml/2006/main">
   <p:cSld>
     <p:spTree>
@@ -15178,287 +15532,6 @@
         </p:txBody>
       </p:sp>
     </p:spTree>
-  </p:cSld>
-  <p:clrMapOvr>
-    <a:masterClrMapping/>
-  </p:clrMapOvr>
-  <p:transition spd="slow">
-    <p:cut/>
-  </p:transition>
-  <p:timing>
-    <p:tnLst>
-      <p:par>
-        <p:cTn id="1" dur="indefinite" restart="never" nodeType="tmRoot"/>
-      </p:par>
-    </p:tnLst>
-  </p:timing>
-</p:sld>
-</file>
-
-<file path=ppt/slides/slide8.xml><?xml version="1.0" encoding="utf-8"?>
-<p:sld xmlns:a="http://schemas.openxmlformats.org/drawingml/2006/main" xmlns:r="http://schemas.openxmlformats.org/officeDocument/2006/relationships" xmlns:p="http://schemas.openxmlformats.org/presentationml/2006/main">
-  <p:cSld>
-    <p:spTree>
-      <p:nvGrpSpPr>
-        <p:cNvPr id="1" name="Shape 82"/>
-        <p:cNvGrpSpPr/>
-        <p:nvPr/>
-      </p:nvGrpSpPr>
-      <p:grpSpPr>
-        <a:xfrm>
-          <a:off x="0" y="0"/>
-          <a:ext cx="0" cy="0"/>
-          <a:chOff x="0" y="0"/>
-          <a:chExt cx="0" cy="0"/>
-        </a:xfrm>
-      </p:grpSpPr>
-      <p:sp>
-        <p:nvSpPr>
-          <p:cNvPr id="83" name="Shape 83"/>
-          <p:cNvSpPr txBox="1">
-            <a:spLocks noGrp="1"/>
-          </p:cNvSpPr>
-          <p:nvPr>
-            <p:ph type="ctrTitle"/>
-          </p:nvPr>
-        </p:nvSpPr>
-        <p:spPr>
-          <a:xfrm>
-            <a:off x="1546025" y="2034925"/>
-            <a:ext cx="5832600" cy="1546500"/>
-          </a:xfrm>
-          <a:prstGeom prst="rect">
-            <a:avLst/>
-          </a:prstGeom>
-        </p:spPr>
-        <p:txBody>
-          <a:bodyPr lIns="91425" tIns="91425" rIns="91425" bIns="91425" anchor="b" anchorCtr="0">
-            <a:noAutofit/>
-          </a:bodyPr>
-          <a:lstStyle/>
-          <a:p>
-            <a:pPr rtl="0">
-              <a:spcBef>
-                <a:spcPts val="0"/>
-              </a:spcBef>
-              <a:buNone/>
-            </a:pPr>
-            <a:r>
-              <a:rPr lang="en" sz="6000" dirty="0">
-                <a:solidFill>
-                  <a:srgbClr val="CFD8DC"/>
-                </a:solidFill>
-              </a:rPr>
-              <a:t>2</a:t>
-            </a:r>
-            <a:r>
-              <a:rPr lang="en" sz="6000" dirty="0" smtClean="0">
-                <a:solidFill>
-                  <a:srgbClr val="CFD8DC"/>
-                </a:solidFill>
-              </a:rPr>
-              <a:t>. </a:t>
-            </a:r>
-            <a:br>
-              <a:rPr lang="en" sz="6000" dirty="0" smtClean="0">
-                <a:solidFill>
-                  <a:srgbClr val="CFD8DC"/>
-                </a:solidFill>
-              </a:rPr>
-            </a:br>
-            <a:r>
-              <a:rPr lang="en" dirty="0" smtClean="0"/>
-              <a:t>Hadoop</a:t>
-            </a:r>
-            <a:endParaRPr lang="en" dirty="0"/>
-          </a:p>
-        </p:txBody>
-      </p:sp>
-      <p:sp>
-        <p:nvSpPr>
-          <p:cNvPr id="84" name="Shape 84"/>
-          <p:cNvSpPr txBox="1">
-            <a:spLocks noGrp="1"/>
-          </p:cNvSpPr>
-          <p:nvPr>
-            <p:ph type="subTitle" idx="1"/>
-          </p:nvPr>
-        </p:nvSpPr>
-        <p:spPr>
-          <a:xfrm>
-            <a:off x="1546025" y="3424110"/>
-            <a:ext cx="5832600" cy="1046400"/>
-          </a:xfrm>
-          <a:prstGeom prst="rect">
-            <a:avLst/>
-          </a:prstGeom>
-        </p:spPr>
-        <p:txBody>
-          <a:bodyPr lIns="91425" tIns="91425" rIns="91425" bIns="91425" anchor="t" anchorCtr="0">
-            <a:noAutofit/>
-          </a:bodyPr>
-          <a:lstStyle/>
-          <a:p>
-            <a:pPr lvl="0" rtl="0">
-              <a:spcBef>
-                <a:spcPts val="0"/>
-              </a:spcBef>
-              <a:buNone/>
-            </a:pPr>
-            <a:r>
-              <a:rPr lang="en" dirty="0" smtClean="0"/>
-              <a:t>HDFS e MapReduce</a:t>
-            </a:r>
-            <a:endParaRPr lang="en" dirty="0"/>
-          </a:p>
-        </p:txBody>
-      </p:sp>
-    </p:spTree>
-    <p:extLst>
-      <p:ext uri="{BB962C8B-B14F-4D97-AF65-F5344CB8AC3E}">
-        <p14:creationId xmlns:p14="http://schemas.microsoft.com/office/powerpoint/2010/main" val="3176358835"/>
-      </p:ext>
-    </p:extLst>
-  </p:cSld>
-  <p:clrMapOvr>
-    <a:masterClrMapping/>
-  </p:clrMapOvr>
-  <p:transition spd="slow">
-    <p:cut/>
-  </p:transition>
-  <p:timing>
-    <p:tnLst>
-      <p:par>
-        <p:cTn id="1" dur="indefinite" restart="never" nodeType="tmRoot"/>
-      </p:par>
-    </p:tnLst>
-  </p:timing>
-</p:sld>
-</file>
-
-<file path=ppt/slides/slide9.xml><?xml version="1.0" encoding="utf-8"?>
-<p:sld xmlns:a="http://schemas.openxmlformats.org/drawingml/2006/main" xmlns:r="http://schemas.openxmlformats.org/officeDocument/2006/relationships" xmlns:p="http://schemas.openxmlformats.org/presentationml/2006/main">
-  <p:cSld>
-    <p:spTree>
-      <p:nvGrpSpPr>
-        <p:cNvPr id="1" name="Shape 93"/>
-        <p:cNvGrpSpPr/>
-        <p:nvPr/>
-      </p:nvGrpSpPr>
-      <p:grpSpPr>
-        <a:xfrm>
-          <a:off x="0" y="0"/>
-          <a:ext cx="0" cy="0"/>
-          <a:chOff x="0" y="0"/>
-          <a:chExt cx="0" cy="0"/>
-        </a:xfrm>
-      </p:grpSpPr>
-      <p:sp>
-        <p:nvSpPr>
-          <p:cNvPr id="94" name="Shape 94"/>
-          <p:cNvSpPr txBox="1">
-            <a:spLocks noGrp="1"/>
-          </p:cNvSpPr>
-          <p:nvPr>
-            <p:ph type="title"/>
-          </p:nvPr>
-        </p:nvSpPr>
-        <p:spPr>
-          <a:xfrm>
-            <a:off x="786150" y="410826"/>
-            <a:ext cx="7571700" cy="936899"/>
-          </a:xfrm>
-          <a:prstGeom prst="rect">
-            <a:avLst/>
-          </a:prstGeom>
-        </p:spPr>
-        <p:txBody>
-          <a:bodyPr lIns="91425" tIns="91425" rIns="91425" bIns="91425" anchor="b" anchorCtr="0">
-            <a:noAutofit/>
-          </a:bodyPr>
-          <a:lstStyle/>
-          <a:p>
-            <a:pPr>
-              <a:spcBef>
-                <a:spcPts val="0"/>
-              </a:spcBef>
-              <a:buNone/>
-            </a:pPr>
-            <a:r>
-              <a:rPr lang="en" dirty="0" smtClean="0"/>
-              <a:t>2.1 Oque é Hadoop?</a:t>
-            </a:r>
-            <a:endParaRPr lang="en" dirty="0"/>
-          </a:p>
-        </p:txBody>
-      </p:sp>
-      <p:sp>
-        <p:nvSpPr>
-          <p:cNvPr id="95" name="Shape 95"/>
-          <p:cNvSpPr txBox="1">
-            <a:spLocks noGrp="1"/>
-          </p:cNvSpPr>
-          <p:nvPr>
-            <p:ph type="body" idx="1"/>
-          </p:nvPr>
-        </p:nvSpPr>
-        <p:spPr>
-          <a:xfrm>
-            <a:off x="786150" y="1682266"/>
-            <a:ext cx="7571700" cy="4764899"/>
-          </a:xfrm>
-          <a:prstGeom prst="rect">
-            <a:avLst/>
-          </a:prstGeom>
-        </p:spPr>
-        <p:txBody>
-          <a:bodyPr lIns="91425" tIns="91425" rIns="91425" bIns="91425" anchor="t" anchorCtr="0">
-            <a:noAutofit/>
-          </a:bodyPr>
-          <a:lstStyle/>
-          <a:p>
-            <a:pPr marL="457200" lvl="0" indent="-228600" rtl="0">
-              <a:spcBef>
-                <a:spcPts val="0"/>
-              </a:spcBef>
-            </a:pPr>
-            <a:r>
-              <a:rPr lang="en" dirty="0" smtClean="0"/>
-              <a:t>Infraestrutura para o processamento distribuido de grandes massas de dados.</a:t>
-            </a:r>
-            <a:endParaRPr lang="en" dirty="0"/>
-          </a:p>
-          <a:p>
-            <a:pPr marL="457200" lvl="0" indent="-228600"/>
-            <a:r>
-              <a:rPr lang="pt-BR" dirty="0" smtClean="0"/>
-              <a:t>Desenvolvido pela Yahoo e atualmente mantido pela Apache Foundation</a:t>
-            </a:r>
-          </a:p>
-          <a:p>
-            <a:pPr marL="457200" lvl="0" indent="-228600"/>
-            <a:r>
-              <a:rPr lang="pt-BR" dirty="0" smtClean="0"/>
-              <a:t>Estrutura de código aberto que permite obter valor de dados estruturados e não estruturados.</a:t>
-            </a:r>
-            <a:endParaRPr lang="en" dirty="0" smtClean="0"/>
-          </a:p>
-          <a:p>
-            <a:pPr marL="457200" lvl="0" indent="-228600" rtl="0">
-              <a:spcBef>
-                <a:spcPts val="0"/>
-              </a:spcBef>
-            </a:pPr>
-            <a:endParaRPr lang="en" dirty="0"/>
-          </a:p>
-        </p:txBody>
-      </p:sp>
-    </p:spTree>
-    <p:extLst>
-      <p:ext uri="{BB962C8B-B14F-4D97-AF65-F5344CB8AC3E}">
-        <p14:creationId xmlns:p14="http://schemas.microsoft.com/office/powerpoint/2010/main" val="4243059255"/>
-      </p:ext>
-    </p:extLst>
   </p:cSld>
   <p:clrMapOvr>
     <a:masterClrMapping/>

</xml_diff>